<commit_message>
Zápisy + prezentace + final vize
</commit_message>
<xml_diff>
--- a/prezentace_z_2_cviceni.pptx
+++ b/prezentace_z_2_cviceni.pptx
@@ -4,23 +4,18 @@
   <p:sldMasterIdLst>
     <p:sldMasterId id="2147483660" r:id="rId1"/>
   </p:sldMasterIdLst>
-  <p:notesMasterIdLst>
-    <p:notesMasterId r:id="rId15"/>
-  </p:notesMasterIdLst>
   <p:sldIdLst>
     <p:sldId id="256" r:id="rId2"/>
-    <p:sldId id="267" r:id="rId3"/>
-    <p:sldId id="268" r:id="rId4"/>
-    <p:sldId id="269" r:id="rId5"/>
-    <p:sldId id="270" r:id="rId6"/>
-    <p:sldId id="271" r:id="rId7"/>
-    <p:sldId id="272" r:id="rId8"/>
-    <p:sldId id="273" r:id="rId9"/>
-    <p:sldId id="274" r:id="rId10"/>
-    <p:sldId id="275" r:id="rId11"/>
-    <p:sldId id="277" r:id="rId12"/>
-    <p:sldId id="265" r:id="rId13"/>
-    <p:sldId id="276" r:id="rId14"/>
+    <p:sldId id="257" r:id="rId3"/>
+    <p:sldId id="258" r:id="rId4"/>
+    <p:sldId id="259" r:id="rId5"/>
+    <p:sldId id="260" r:id="rId6"/>
+    <p:sldId id="261" r:id="rId7"/>
+    <p:sldId id="263" r:id="rId8"/>
+    <p:sldId id="264" r:id="rId9"/>
+    <p:sldId id="265" r:id="rId10"/>
+    <p:sldId id="268" r:id="rId11"/>
+    <p:sldId id="266" r:id="rId12"/>
   </p:sldIdLst>
   <p:sldSz cx="9144000" cy="6858000" type="screen4x3"/>
   <p:notesSz cx="6858000" cy="9144000"/>
@@ -122,1096 +117,6 @@
 </p:presentation>
 </file>
 
-<file path=ppt/notesMasters/notesMaster1.xml><?xml version="1.0" encoding="utf-8"?>
-<p:notesMaster xmlns:a="http://schemas.openxmlformats.org/drawingml/2006/main" xmlns:r="http://schemas.openxmlformats.org/officeDocument/2006/relationships" xmlns:p="http://schemas.openxmlformats.org/presentationml/2006/main">
-  <p:cSld>
-    <p:bg>
-      <p:bgRef idx="1001">
-        <a:schemeClr val="bg1"/>
-      </p:bgRef>
-    </p:bg>
-    <p:spTree>
-      <p:nvGrpSpPr>
-        <p:cNvPr id="1" name=""/>
-        <p:cNvGrpSpPr/>
-        <p:nvPr/>
-      </p:nvGrpSpPr>
-      <p:grpSpPr>
-        <a:xfrm>
-          <a:off x="0" y="0"/>
-          <a:ext cx="0" cy="0"/>
-          <a:chOff x="0" y="0"/>
-          <a:chExt cx="0" cy="0"/>
-        </a:xfrm>
-      </p:grpSpPr>
-      <p:sp>
-        <p:nvSpPr>
-          <p:cNvPr id="2" name="Zástupný symbol pro záhlaví 1"/>
-          <p:cNvSpPr>
-            <a:spLocks noGrp="1"/>
-          </p:cNvSpPr>
-          <p:nvPr>
-            <p:ph type="hdr" sz="quarter"/>
-          </p:nvPr>
-        </p:nvSpPr>
-        <p:spPr>
-          <a:xfrm>
-            <a:off x="0" y="0"/>
-            <a:ext cx="2971800" cy="457200"/>
-          </a:xfrm>
-          <a:prstGeom prst="rect">
-            <a:avLst/>
-          </a:prstGeom>
-        </p:spPr>
-        <p:txBody>
-          <a:bodyPr vert="horz" lIns="91440" tIns="45720" rIns="91440" bIns="45720" rtlCol="0"/>
-          <a:lstStyle>
-            <a:lvl1pPr algn="l">
-              <a:defRPr sz="1200"/>
-            </a:lvl1pPr>
-          </a:lstStyle>
-          <a:p>
-            <a:endParaRPr lang="cs-CZ"/>
-          </a:p>
-        </p:txBody>
-      </p:sp>
-      <p:sp>
-        <p:nvSpPr>
-          <p:cNvPr id="3" name="Zástupný symbol pro datum 2"/>
-          <p:cNvSpPr>
-            <a:spLocks noGrp="1"/>
-          </p:cNvSpPr>
-          <p:nvPr>
-            <p:ph type="dt" idx="1"/>
-          </p:nvPr>
-        </p:nvSpPr>
-        <p:spPr>
-          <a:xfrm>
-            <a:off x="3884613" y="0"/>
-            <a:ext cx="2971800" cy="457200"/>
-          </a:xfrm>
-          <a:prstGeom prst="rect">
-            <a:avLst/>
-          </a:prstGeom>
-        </p:spPr>
-        <p:txBody>
-          <a:bodyPr vert="horz" lIns="91440" tIns="45720" rIns="91440" bIns="45720" rtlCol="0"/>
-          <a:lstStyle>
-            <a:lvl1pPr algn="r">
-              <a:defRPr sz="1200"/>
-            </a:lvl1pPr>
-          </a:lstStyle>
-          <a:p>
-            <a:fld id="{7B638017-BDFE-481E-A73F-1DC2345D7BC2}" type="datetimeFigureOut">
-              <a:rPr lang="cs-CZ" smtClean="0"/>
-              <a:t>20.10.2016</a:t>
-            </a:fld>
-            <a:endParaRPr lang="cs-CZ"/>
-          </a:p>
-        </p:txBody>
-      </p:sp>
-      <p:sp>
-        <p:nvSpPr>
-          <p:cNvPr id="4" name="Zástupný symbol pro obrázek snímku 3"/>
-          <p:cNvSpPr>
-            <a:spLocks noGrp="1" noRot="1" noChangeAspect="1"/>
-          </p:cNvSpPr>
-          <p:nvPr>
-            <p:ph type="sldImg" idx="2"/>
-          </p:nvPr>
-        </p:nvSpPr>
-        <p:spPr>
-          <a:xfrm>
-            <a:off x="1143000" y="685800"/>
-            <a:ext cx="4572000" cy="3429000"/>
-          </a:xfrm>
-          <a:prstGeom prst="rect">
-            <a:avLst/>
-          </a:prstGeom>
-          <a:noFill/>
-          <a:ln w="12700">
-            <a:solidFill>
-              <a:prstClr val="black"/>
-            </a:solidFill>
-          </a:ln>
-        </p:spPr>
-        <p:txBody>
-          <a:bodyPr vert="horz" lIns="91440" tIns="45720" rIns="91440" bIns="45720" rtlCol="0" anchor="ctr"/>
-          <a:lstStyle/>
-          <a:p>
-            <a:endParaRPr lang="cs-CZ"/>
-          </a:p>
-        </p:txBody>
-      </p:sp>
-      <p:sp>
-        <p:nvSpPr>
-          <p:cNvPr id="5" name="Zástupný symbol pro poznámky 4"/>
-          <p:cNvSpPr>
-            <a:spLocks noGrp="1"/>
-          </p:cNvSpPr>
-          <p:nvPr>
-            <p:ph type="body" sz="quarter" idx="3"/>
-          </p:nvPr>
-        </p:nvSpPr>
-        <p:spPr>
-          <a:xfrm>
-            <a:off x="685800" y="4343400"/>
-            <a:ext cx="5486400" cy="4114800"/>
-          </a:xfrm>
-          <a:prstGeom prst="rect">
-            <a:avLst/>
-          </a:prstGeom>
-        </p:spPr>
-        <p:txBody>
-          <a:bodyPr vert="horz" lIns="91440" tIns="45720" rIns="91440" bIns="45720" rtlCol="0"/>
-          <a:lstStyle/>
-          <a:p>
-            <a:pPr lvl="0"/>
-            <a:r>
-              <a:rPr lang="cs-CZ" smtClean="0"/>
-              <a:t>Kliknutím lze upravit styly předlohy textu.</a:t>
-            </a:r>
-          </a:p>
-          <a:p>
-            <a:pPr lvl="1"/>
-            <a:r>
-              <a:rPr lang="cs-CZ" smtClean="0"/>
-              <a:t>Druhá úroveň</a:t>
-            </a:r>
-          </a:p>
-          <a:p>
-            <a:pPr lvl="2"/>
-            <a:r>
-              <a:rPr lang="cs-CZ" smtClean="0"/>
-              <a:t>Třetí úroveň</a:t>
-            </a:r>
-          </a:p>
-          <a:p>
-            <a:pPr lvl="3"/>
-            <a:r>
-              <a:rPr lang="cs-CZ" smtClean="0"/>
-              <a:t>Čtvrtá úroveň</a:t>
-            </a:r>
-          </a:p>
-          <a:p>
-            <a:pPr lvl="4"/>
-            <a:r>
-              <a:rPr lang="cs-CZ" smtClean="0"/>
-              <a:t>Pátá úroveň</a:t>
-            </a:r>
-            <a:endParaRPr lang="cs-CZ"/>
-          </a:p>
-        </p:txBody>
-      </p:sp>
-      <p:sp>
-        <p:nvSpPr>
-          <p:cNvPr id="6" name="Zástupný symbol pro zápatí 5"/>
-          <p:cNvSpPr>
-            <a:spLocks noGrp="1"/>
-          </p:cNvSpPr>
-          <p:nvPr>
-            <p:ph type="ftr" sz="quarter" idx="4"/>
-          </p:nvPr>
-        </p:nvSpPr>
-        <p:spPr>
-          <a:xfrm>
-            <a:off x="0" y="8685213"/>
-            <a:ext cx="2971800" cy="457200"/>
-          </a:xfrm>
-          <a:prstGeom prst="rect">
-            <a:avLst/>
-          </a:prstGeom>
-        </p:spPr>
-        <p:txBody>
-          <a:bodyPr vert="horz" lIns="91440" tIns="45720" rIns="91440" bIns="45720" rtlCol="0" anchor="b"/>
-          <a:lstStyle>
-            <a:lvl1pPr algn="l">
-              <a:defRPr sz="1200"/>
-            </a:lvl1pPr>
-          </a:lstStyle>
-          <a:p>
-            <a:endParaRPr lang="cs-CZ"/>
-          </a:p>
-        </p:txBody>
-      </p:sp>
-      <p:sp>
-        <p:nvSpPr>
-          <p:cNvPr id="7" name="Zástupný symbol pro číslo snímku 6"/>
-          <p:cNvSpPr>
-            <a:spLocks noGrp="1"/>
-          </p:cNvSpPr>
-          <p:nvPr>
-            <p:ph type="sldNum" sz="quarter" idx="5"/>
-          </p:nvPr>
-        </p:nvSpPr>
-        <p:spPr>
-          <a:xfrm>
-            <a:off x="3884613" y="8685213"/>
-            <a:ext cx="2971800" cy="457200"/>
-          </a:xfrm>
-          <a:prstGeom prst="rect">
-            <a:avLst/>
-          </a:prstGeom>
-        </p:spPr>
-        <p:txBody>
-          <a:bodyPr vert="horz" lIns="91440" tIns="45720" rIns="91440" bIns="45720" rtlCol="0" anchor="b"/>
-          <a:lstStyle>
-            <a:lvl1pPr algn="r">
-              <a:defRPr sz="1200"/>
-            </a:lvl1pPr>
-          </a:lstStyle>
-          <a:p>
-            <a:fld id="{CAA8101A-E4FD-4368-B5ED-4BC9D7603315}" type="slidenum">
-              <a:rPr lang="cs-CZ" smtClean="0"/>
-              <a:t>‹#›</a:t>
-            </a:fld>
-            <a:endParaRPr lang="cs-CZ"/>
-          </a:p>
-        </p:txBody>
-      </p:sp>
-    </p:spTree>
-    <p:extLst>
-      <p:ext uri="{BB962C8B-B14F-4D97-AF65-F5344CB8AC3E}">
-        <p14:creationId xmlns:p14="http://schemas.microsoft.com/office/powerpoint/2010/main" val="2210666920"/>
-      </p:ext>
-    </p:extLst>
-  </p:cSld>
-  <p:clrMap bg1="lt1" tx1="dk1" bg2="lt2" tx2="dk2" accent1="accent1" accent2="accent2" accent3="accent3" accent4="accent4" accent5="accent5" accent6="accent6" hlink="hlink" folHlink="folHlink"/>
-  <p:notesStyle>
-    <a:lvl1pPr marL="0" algn="l" defTabSz="914400" rtl="0" eaLnBrk="1" latinLnBrk="0" hangingPunct="1">
-      <a:defRPr sz="1200" kern="1200">
-        <a:solidFill>
-          <a:schemeClr val="tx1"/>
-        </a:solidFill>
-        <a:latin typeface="+mn-lt"/>
-        <a:ea typeface="+mn-ea"/>
-        <a:cs typeface="+mn-cs"/>
-      </a:defRPr>
-    </a:lvl1pPr>
-    <a:lvl2pPr marL="457200" algn="l" defTabSz="914400" rtl="0" eaLnBrk="1" latinLnBrk="0" hangingPunct="1">
-      <a:defRPr sz="1200" kern="1200">
-        <a:solidFill>
-          <a:schemeClr val="tx1"/>
-        </a:solidFill>
-        <a:latin typeface="+mn-lt"/>
-        <a:ea typeface="+mn-ea"/>
-        <a:cs typeface="+mn-cs"/>
-      </a:defRPr>
-    </a:lvl2pPr>
-    <a:lvl3pPr marL="914400" algn="l" defTabSz="914400" rtl="0" eaLnBrk="1" latinLnBrk="0" hangingPunct="1">
-      <a:defRPr sz="1200" kern="1200">
-        <a:solidFill>
-          <a:schemeClr val="tx1"/>
-        </a:solidFill>
-        <a:latin typeface="+mn-lt"/>
-        <a:ea typeface="+mn-ea"/>
-        <a:cs typeface="+mn-cs"/>
-      </a:defRPr>
-    </a:lvl3pPr>
-    <a:lvl4pPr marL="1371600" algn="l" defTabSz="914400" rtl="0" eaLnBrk="1" latinLnBrk="0" hangingPunct="1">
-      <a:defRPr sz="1200" kern="1200">
-        <a:solidFill>
-          <a:schemeClr val="tx1"/>
-        </a:solidFill>
-        <a:latin typeface="+mn-lt"/>
-        <a:ea typeface="+mn-ea"/>
-        <a:cs typeface="+mn-cs"/>
-      </a:defRPr>
-    </a:lvl4pPr>
-    <a:lvl5pPr marL="1828800" algn="l" defTabSz="914400" rtl="0" eaLnBrk="1" latinLnBrk="0" hangingPunct="1">
-      <a:defRPr sz="1200" kern="1200">
-        <a:solidFill>
-          <a:schemeClr val="tx1"/>
-        </a:solidFill>
-        <a:latin typeface="+mn-lt"/>
-        <a:ea typeface="+mn-ea"/>
-        <a:cs typeface="+mn-cs"/>
-      </a:defRPr>
-    </a:lvl5pPr>
-    <a:lvl6pPr marL="2286000" algn="l" defTabSz="914400" rtl="0" eaLnBrk="1" latinLnBrk="0" hangingPunct="1">
-      <a:defRPr sz="1200" kern="1200">
-        <a:solidFill>
-          <a:schemeClr val="tx1"/>
-        </a:solidFill>
-        <a:latin typeface="+mn-lt"/>
-        <a:ea typeface="+mn-ea"/>
-        <a:cs typeface="+mn-cs"/>
-      </a:defRPr>
-    </a:lvl6pPr>
-    <a:lvl7pPr marL="2743200" algn="l" defTabSz="914400" rtl="0" eaLnBrk="1" latinLnBrk="0" hangingPunct="1">
-      <a:defRPr sz="1200" kern="1200">
-        <a:solidFill>
-          <a:schemeClr val="tx1"/>
-        </a:solidFill>
-        <a:latin typeface="+mn-lt"/>
-        <a:ea typeface="+mn-ea"/>
-        <a:cs typeface="+mn-cs"/>
-      </a:defRPr>
-    </a:lvl7pPr>
-    <a:lvl8pPr marL="3200400" algn="l" defTabSz="914400" rtl="0" eaLnBrk="1" latinLnBrk="0" hangingPunct="1">
-      <a:defRPr sz="1200" kern="1200">
-        <a:solidFill>
-          <a:schemeClr val="tx1"/>
-        </a:solidFill>
-        <a:latin typeface="+mn-lt"/>
-        <a:ea typeface="+mn-ea"/>
-        <a:cs typeface="+mn-cs"/>
-      </a:defRPr>
-    </a:lvl8pPr>
-    <a:lvl9pPr marL="3657600" algn="l" defTabSz="914400" rtl="0" eaLnBrk="1" latinLnBrk="0" hangingPunct="1">
-      <a:defRPr sz="1200" kern="1200">
-        <a:solidFill>
-          <a:schemeClr val="tx1"/>
-        </a:solidFill>
-        <a:latin typeface="+mn-lt"/>
-        <a:ea typeface="+mn-ea"/>
-        <a:cs typeface="+mn-cs"/>
-      </a:defRPr>
-    </a:lvl9pPr>
-  </p:notesStyle>
-</p:notesMaster>
-</file>
-
-<file path=ppt/notesSlides/notesSlide1.xml><?xml version="1.0" encoding="utf-8"?>
-<p:notes xmlns:a="http://schemas.openxmlformats.org/drawingml/2006/main" xmlns:r="http://schemas.openxmlformats.org/officeDocument/2006/relationships" xmlns:p="http://schemas.openxmlformats.org/presentationml/2006/main">
-  <p:cSld>
-    <p:spTree>
-      <p:nvGrpSpPr>
-        <p:cNvPr id="1" name=""/>
-        <p:cNvGrpSpPr/>
-        <p:nvPr/>
-      </p:nvGrpSpPr>
-      <p:grpSpPr>
-        <a:xfrm>
-          <a:off x="0" y="0"/>
-          <a:ext cx="0" cy="0"/>
-          <a:chOff x="0" y="0"/>
-          <a:chExt cx="0" cy="0"/>
-        </a:xfrm>
-      </p:grpSpPr>
-      <p:sp>
-        <p:nvSpPr>
-          <p:cNvPr id="2" name="Zástupný symbol pro obrázek snímku 1"/>
-          <p:cNvSpPr>
-            <a:spLocks noGrp="1" noRot="1" noChangeAspect="1"/>
-          </p:cNvSpPr>
-          <p:nvPr>
-            <p:ph type="sldImg"/>
-          </p:nvPr>
-        </p:nvSpPr>
-        <p:spPr/>
-      </p:sp>
-      <p:sp>
-        <p:nvSpPr>
-          <p:cNvPr id="3" name="Zástupný symbol pro poznámky 2"/>
-          <p:cNvSpPr>
-            <a:spLocks noGrp="1"/>
-          </p:cNvSpPr>
-          <p:nvPr>
-            <p:ph type="body" idx="1"/>
-          </p:nvPr>
-        </p:nvSpPr>
-        <p:spPr/>
-        <p:txBody>
-          <a:bodyPr/>
-          <a:lstStyle/>
-          <a:p>
-            <a:r>
-              <a:rPr lang="cs-CZ" dirty="0" smtClean="0"/>
-              <a:t> </a:t>
-            </a:r>
-          </a:p>
-          <a:p>
-            <a:r>
-              <a:rPr lang="cs-CZ" u="sng" dirty="0" smtClean="0"/>
-              <a:t>Základní verze</a:t>
-            </a:r>
-            <a:endParaRPr lang="cs-CZ" dirty="0" smtClean="0"/>
-          </a:p>
-          <a:p>
-            <a:r>
-              <a:rPr lang="cs-CZ" dirty="0" smtClean="0"/>
-              <a:t>	Tento projekt zákazníkovi přinese větší přehled nad transakcemi, které se v jeho restauraci dějí a také by měl tímto zamezit krádežím peněz a zboží v jeho podniku. Dále by se měla zvýšit bezpečnost personálu i hostů.</a:t>
-            </a:r>
-          </a:p>
-          <a:p>
-            <a:r>
-              <a:rPr lang="cs-CZ" dirty="0" smtClean="0"/>
-              <a:t> </a:t>
-            </a:r>
-          </a:p>
-          <a:p>
-            <a:r>
-              <a:rPr lang="cs-CZ" u="sng" dirty="0" smtClean="0"/>
-              <a:t>Nadstavba</a:t>
-            </a:r>
-            <a:endParaRPr lang="cs-CZ" dirty="0" smtClean="0"/>
-          </a:p>
-          <a:p>
-            <a:r>
-              <a:rPr lang="cs-CZ" dirty="0" smtClean="0"/>
-              <a:t>	Včetně všeho, co obsahuje základní verze, přinese tato nadstavba zákazníkovi vyšší obsazenost restaurace a skrz to i větší zisky. Dále pak větší povědomí o restauraci ve veřejném prostoru.</a:t>
-            </a:r>
-          </a:p>
-          <a:p>
-            <a:endParaRPr lang="cs-CZ" dirty="0"/>
-          </a:p>
-        </p:txBody>
-      </p:sp>
-      <p:sp>
-        <p:nvSpPr>
-          <p:cNvPr id="4" name="Zástupný symbol pro číslo snímku 3"/>
-          <p:cNvSpPr>
-            <a:spLocks noGrp="1"/>
-          </p:cNvSpPr>
-          <p:nvPr>
-            <p:ph type="sldNum" sz="quarter" idx="10"/>
-          </p:nvPr>
-        </p:nvSpPr>
-        <p:spPr/>
-        <p:txBody>
-          <a:bodyPr/>
-          <a:lstStyle/>
-          <a:p>
-            <a:fld id="{CAA8101A-E4FD-4368-B5ED-4BC9D7603315}" type="slidenum">
-              <a:rPr lang="cs-CZ" smtClean="0"/>
-              <a:t>6</a:t>
-            </a:fld>
-            <a:endParaRPr lang="cs-CZ"/>
-          </a:p>
-        </p:txBody>
-      </p:sp>
-    </p:spTree>
-    <p:extLst>
-      <p:ext uri="{BB962C8B-B14F-4D97-AF65-F5344CB8AC3E}">
-        <p14:creationId xmlns:p14="http://schemas.microsoft.com/office/powerpoint/2010/main" val="163251193"/>
-      </p:ext>
-    </p:extLst>
-  </p:cSld>
-  <p:clrMapOvr>
-    <a:masterClrMapping/>
-  </p:clrMapOvr>
-</p:notes>
-</file>
-
-<file path=ppt/notesSlides/notesSlide2.xml><?xml version="1.0" encoding="utf-8"?>
-<p:notes xmlns:a="http://schemas.openxmlformats.org/drawingml/2006/main" xmlns:r="http://schemas.openxmlformats.org/officeDocument/2006/relationships" xmlns:p="http://schemas.openxmlformats.org/presentationml/2006/main">
-  <p:cSld>
-    <p:spTree>
-      <p:nvGrpSpPr>
-        <p:cNvPr id="1" name=""/>
-        <p:cNvGrpSpPr/>
-        <p:nvPr/>
-      </p:nvGrpSpPr>
-      <p:grpSpPr>
-        <a:xfrm>
-          <a:off x="0" y="0"/>
-          <a:ext cx="0" cy="0"/>
-          <a:chOff x="0" y="0"/>
-          <a:chExt cx="0" cy="0"/>
-        </a:xfrm>
-      </p:grpSpPr>
-      <p:sp>
-        <p:nvSpPr>
-          <p:cNvPr id="2" name="Zástupný symbol pro obrázek snímku 1"/>
-          <p:cNvSpPr>
-            <a:spLocks noGrp="1" noRot="1" noChangeAspect="1"/>
-          </p:cNvSpPr>
-          <p:nvPr>
-            <p:ph type="sldImg"/>
-          </p:nvPr>
-        </p:nvSpPr>
-        <p:spPr/>
-      </p:sp>
-      <p:sp>
-        <p:nvSpPr>
-          <p:cNvPr id="3" name="Zástupný symbol pro poznámky 2"/>
-          <p:cNvSpPr>
-            <a:spLocks noGrp="1"/>
-          </p:cNvSpPr>
-          <p:nvPr>
-            <p:ph type="body" idx="1"/>
-          </p:nvPr>
-        </p:nvSpPr>
-        <p:spPr/>
-        <p:txBody>
-          <a:bodyPr/>
-          <a:lstStyle/>
-          <a:p>
-            <a:r>
-              <a:rPr lang="cs-CZ" sz="1200" u="sng" kern="1200" dirty="0" smtClean="0">
-                <a:solidFill>
-                  <a:schemeClr val="tx1"/>
-                </a:solidFill>
-                <a:effectLst/>
-                <a:latin typeface="+mn-lt"/>
-                <a:ea typeface="+mn-ea"/>
-                <a:cs typeface="+mn-cs"/>
-              </a:rPr>
-              <a:t>Základní verze</a:t>
-            </a:r>
-            <a:endParaRPr lang="cs-CZ" sz="1200" kern="1200" dirty="0" smtClean="0">
-              <a:solidFill>
-                <a:schemeClr val="tx1"/>
-              </a:solidFill>
-              <a:effectLst/>
-              <a:latin typeface="+mn-lt"/>
-              <a:ea typeface="+mn-ea"/>
-              <a:cs typeface="+mn-cs"/>
-            </a:endParaRPr>
-          </a:p>
-          <a:p>
-            <a:r>
-              <a:rPr lang="cs-CZ" sz="1200" kern="1200" dirty="0" smtClean="0">
-                <a:solidFill>
-                  <a:schemeClr val="tx1"/>
-                </a:solidFill>
-                <a:effectLst/>
-                <a:latin typeface="+mn-lt"/>
-                <a:ea typeface="+mn-ea"/>
-                <a:cs typeface="+mn-cs"/>
-              </a:rPr>
-              <a:t>	Projekt bude úspěšný v případě, že </a:t>
-            </a:r>
-          </a:p>
-          <a:p>
-            <a:pPr lvl="0"/>
-            <a:r>
-              <a:rPr lang="cs-CZ" sz="1200" kern="1200" dirty="0" smtClean="0">
-                <a:solidFill>
-                  <a:schemeClr val="tx1"/>
-                </a:solidFill>
-                <a:effectLst/>
-                <a:latin typeface="+mn-lt"/>
-                <a:ea typeface="+mn-ea"/>
-                <a:cs typeface="+mn-cs"/>
-              </a:rPr>
-              <a:t>se nám podaří vytvořit transparentní systém, který bude zajišťovat, aby měl zákazník přehled o veškerých finančních a materiálových transakcích, které se v hospodě dějí.</a:t>
-            </a:r>
-          </a:p>
-          <a:p>
-            <a:pPr lvl="0"/>
-            <a:r>
-              <a:rPr lang="cs-CZ" sz="1200" kern="1200" dirty="0" smtClean="0">
-                <a:solidFill>
-                  <a:schemeClr val="tx1"/>
-                </a:solidFill>
-                <a:effectLst/>
-                <a:latin typeface="+mn-lt"/>
-                <a:ea typeface="+mn-ea"/>
-                <a:cs typeface="+mn-cs"/>
-              </a:rPr>
-              <a:t>zredukujeme peněžní a materiální ztráty o 90%. </a:t>
-            </a:r>
-          </a:p>
-          <a:p>
-            <a:r>
-              <a:rPr lang="cs-CZ" sz="1200" kern="1200" dirty="0" smtClean="0">
-                <a:solidFill>
-                  <a:schemeClr val="tx1"/>
-                </a:solidFill>
-                <a:effectLst/>
-                <a:latin typeface="+mn-lt"/>
-                <a:ea typeface="+mn-ea"/>
-                <a:cs typeface="+mn-cs"/>
-              </a:rPr>
-              <a:t>	</a:t>
-            </a:r>
-          </a:p>
-          <a:p>
-            <a:r>
-              <a:rPr lang="cs-CZ" sz="1200" kern="1200" dirty="0" smtClean="0">
-                <a:solidFill>
-                  <a:schemeClr val="tx1"/>
-                </a:solidFill>
-                <a:effectLst/>
-                <a:latin typeface="+mn-lt"/>
-                <a:ea typeface="+mn-ea"/>
-                <a:cs typeface="+mn-cs"/>
-              </a:rPr>
-              <a:t> </a:t>
-            </a:r>
-          </a:p>
-          <a:p>
-            <a:r>
-              <a:rPr lang="cs-CZ" sz="1200" u="sng" kern="1200" dirty="0" smtClean="0">
-                <a:solidFill>
-                  <a:schemeClr val="tx1"/>
-                </a:solidFill>
-                <a:effectLst/>
-                <a:latin typeface="+mn-lt"/>
-                <a:ea typeface="+mn-ea"/>
-                <a:cs typeface="+mn-cs"/>
-              </a:rPr>
-              <a:t>Nadstavba</a:t>
-            </a:r>
-            <a:endParaRPr lang="cs-CZ" sz="1200" kern="1200" dirty="0" smtClean="0">
-              <a:solidFill>
-                <a:schemeClr val="tx1"/>
-              </a:solidFill>
-              <a:effectLst/>
-              <a:latin typeface="+mn-lt"/>
-              <a:ea typeface="+mn-ea"/>
-              <a:cs typeface="+mn-cs"/>
-            </a:endParaRPr>
-          </a:p>
-          <a:p>
-            <a:r>
-              <a:rPr lang="cs-CZ" sz="1200" kern="1200" dirty="0" smtClean="0">
-                <a:solidFill>
-                  <a:schemeClr val="tx1"/>
-                </a:solidFill>
-                <a:effectLst/>
-                <a:latin typeface="+mn-lt"/>
-                <a:ea typeface="+mn-ea"/>
-                <a:cs typeface="+mn-cs"/>
-              </a:rPr>
-              <a:t>	Projekt bude úspěšný, pokud se nám podaří</a:t>
-            </a:r>
-          </a:p>
-          <a:p>
-            <a:pPr lvl="0"/>
-            <a:r>
-              <a:rPr lang="cs-CZ" sz="1200" kern="1200" dirty="0" smtClean="0">
-                <a:solidFill>
-                  <a:schemeClr val="tx1"/>
-                </a:solidFill>
-                <a:effectLst/>
-                <a:latin typeface="+mn-lt"/>
-                <a:ea typeface="+mn-ea"/>
-                <a:cs typeface="+mn-cs"/>
-              </a:rPr>
-              <a:t>zvýšit marketingovou kampaní obsazenost restaurace na 75%.</a:t>
-            </a:r>
-          </a:p>
-          <a:p>
-            <a:pPr lvl="0"/>
-            <a:r>
-              <a:rPr lang="cs-CZ" sz="1200" kern="1200" dirty="0" smtClean="0">
-                <a:solidFill>
-                  <a:schemeClr val="tx1"/>
-                </a:solidFill>
-                <a:effectLst/>
-                <a:latin typeface="+mn-lt"/>
-                <a:ea typeface="+mn-ea"/>
-                <a:cs typeface="+mn-cs"/>
-              </a:rPr>
-              <a:t>zvýšení návštěvnosti webových stránek na čtyřnásobek.</a:t>
-            </a:r>
-          </a:p>
-          <a:p>
-            <a:r>
-              <a:rPr lang="cs-CZ" sz="1200" kern="1200" dirty="0" smtClean="0">
-                <a:solidFill>
-                  <a:schemeClr val="tx1"/>
-                </a:solidFill>
-                <a:effectLst/>
-                <a:latin typeface="+mn-lt"/>
-                <a:ea typeface="+mn-ea"/>
-                <a:cs typeface="+mn-cs"/>
-              </a:rPr>
-              <a:t> </a:t>
-            </a:r>
-          </a:p>
-          <a:p>
-            <a:endParaRPr lang="cs-CZ" dirty="0"/>
-          </a:p>
-        </p:txBody>
-      </p:sp>
-      <p:sp>
-        <p:nvSpPr>
-          <p:cNvPr id="4" name="Zástupný symbol pro číslo snímku 3"/>
-          <p:cNvSpPr>
-            <a:spLocks noGrp="1"/>
-          </p:cNvSpPr>
-          <p:nvPr>
-            <p:ph type="sldNum" sz="quarter" idx="10"/>
-          </p:nvPr>
-        </p:nvSpPr>
-        <p:spPr/>
-        <p:txBody>
-          <a:bodyPr/>
-          <a:lstStyle/>
-          <a:p>
-            <a:fld id="{CAA8101A-E4FD-4368-B5ED-4BC9D7603315}" type="slidenum">
-              <a:rPr lang="cs-CZ" smtClean="0"/>
-              <a:t>8</a:t>
-            </a:fld>
-            <a:endParaRPr lang="cs-CZ"/>
-          </a:p>
-        </p:txBody>
-      </p:sp>
-    </p:spTree>
-    <p:extLst>
-      <p:ext uri="{BB962C8B-B14F-4D97-AF65-F5344CB8AC3E}">
-        <p14:creationId xmlns:p14="http://schemas.microsoft.com/office/powerpoint/2010/main" val="2778280933"/>
-      </p:ext>
-    </p:extLst>
-  </p:cSld>
-  <p:clrMapOvr>
-    <a:masterClrMapping/>
-  </p:clrMapOvr>
-</p:notes>
-</file>
-
-<file path=ppt/notesSlides/notesSlide3.xml><?xml version="1.0" encoding="utf-8"?>
-<p:notes xmlns:a="http://schemas.openxmlformats.org/drawingml/2006/main" xmlns:r="http://schemas.openxmlformats.org/officeDocument/2006/relationships" xmlns:p="http://schemas.openxmlformats.org/presentationml/2006/main">
-  <p:cSld>
-    <p:spTree>
-      <p:nvGrpSpPr>
-        <p:cNvPr id="1" name=""/>
-        <p:cNvGrpSpPr/>
-        <p:nvPr/>
-      </p:nvGrpSpPr>
-      <p:grpSpPr>
-        <a:xfrm>
-          <a:off x="0" y="0"/>
-          <a:ext cx="0" cy="0"/>
-          <a:chOff x="0" y="0"/>
-          <a:chExt cx="0" cy="0"/>
-        </a:xfrm>
-      </p:grpSpPr>
-      <p:sp>
-        <p:nvSpPr>
-          <p:cNvPr id="2" name="Zástupný symbol pro obrázek snímku 1"/>
-          <p:cNvSpPr>
-            <a:spLocks noGrp="1" noRot="1" noChangeAspect="1"/>
-          </p:cNvSpPr>
-          <p:nvPr>
-            <p:ph type="sldImg"/>
-          </p:nvPr>
-        </p:nvSpPr>
-        <p:spPr/>
-      </p:sp>
-      <p:sp>
-        <p:nvSpPr>
-          <p:cNvPr id="3" name="Zástupný symbol pro poznámky 2"/>
-          <p:cNvSpPr>
-            <a:spLocks noGrp="1"/>
-          </p:cNvSpPr>
-          <p:nvPr>
-            <p:ph type="body" idx="1"/>
-          </p:nvPr>
-        </p:nvSpPr>
-        <p:spPr/>
-        <p:txBody>
-          <a:bodyPr/>
-          <a:lstStyle/>
-          <a:p>
-            <a:r>
-              <a:rPr lang="cs-CZ" u="sng" dirty="0" smtClean="0"/>
-              <a:t>Základní verze</a:t>
-            </a:r>
-            <a:endParaRPr lang="cs-CZ" dirty="0" smtClean="0"/>
-          </a:p>
-          <a:p>
-            <a:r>
-              <a:rPr lang="cs-CZ" dirty="0" smtClean="0"/>
-              <a:t>	Bude nainstalován pokladní a skladový systém a zákazník společně se zaměstnanci budou proškoleni pro práci s tímto systémem.</a:t>
-            </a:r>
-          </a:p>
-          <a:p>
-            <a:r>
-              <a:rPr lang="cs-CZ" dirty="0" smtClean="0"/>
-              <a:t>	Bude nainstalován kamerový systém a zákazník bude proškolen pro práci s tímto systémem.</a:t>
-            </a:r>
-          </a:p>
-          <a:p>
-            <a:r>
-              <a:rPr lang="cs-CZ" dirty="0" smtClean="0"/>
-              <a:t>	</a:t>
-            </a:r>
-          </a:p>
-          <a:p>
-            <a:r>
-              <a:rPr lang="cs-CZ" u="sng" dirty="0" smtClean="0"/>
-              <a:t>Nadstavba</a:t>
-            </a:r>
-            <a:endParaRPr lang="cs-CZ" dirty="0" smtClean="0"/>
-          </a:p>
-          <a:p>
-            <a:r>
-              <a:rPr lang="cs-CZ" dirty="0" smtClean="0"/>
-              <a:t>	Kromě obsahu základní verze zákazník obdrží obchodní plán a marketingový plán v písemné podobě.</a:t>
-            </a:r>
-          </a:p>
-          <a:p>
-            <a:r>
-              <a:rPr lang="cs-CZ" dirty="0" smtClean="0"/>
-              <a:t>	Budou vyhotoveny webové stránky a bude poskytnut návod na obsluhu těchto stránek.</a:t>
-            </a:r>
-          </a:p>
-          <a:p>
-            <a:r>
-              <a:rPr lang="cs-CZ" dirty="0" smtClean="0"/>
-              <a:t>	Bude vytvořena stránka na </a:t>
-            </a:r>
-            <a:r>
-              <a:rPr lang="cs-CZ" dirty="0" err="1" smtClean="0"/>
-              <a:t>Facebooku</a:t>
-            </a:r>
-            <a:r>
-              <a:rPr lang="cs-CZ" dirty="0" smtClean="0"/>
-              <a:t> a předána do správy zákazníkovi.</a:t>
-            </a:r>
-          </a:p>
-          <a:p>
-            <a:endParaRPr lang="cs-CZ" dirty="0"/>
-          </a:p>
-        </p:txBody>
-      </p:sp>
-      <p:sp>
-        <p:nvSpPr>
-          <p:cNvPr id="4" name="Zástupný symbol pro číslo snímku 3"/>
-          <p:cNvSpPr>
-            <a:spLocks noGrp="1"/>
-          </p:cNvSpPr>
-          <p:nvPr>
-            <p:ph type="sldNum" sz="quarter" idx="10"/>
-          </p:nvPr>
-        </p:nvSpPr>
-        <p:spPr/>
-        <p:txBody>
-          <a:bodyPr/>
-          <a:lstStyle/>
-          <a:p>
-            <a:fld id="{CAA8101A-E4FD-4368-B5ED-4BC9D7603315}" type="slidenum">
-              <a:rPr lang="cs-CZ" smtClean="0"/>
-              <a:t>9</a:t>
-            </a:fld>
-            <a:endParaRPr lang="cs-CZ"/>
-          </a:p>
-        </p:txBody>
-      </p:sp>
-    </p:spTree>
-    <p:extLst>
-      <p:ext uri="{BB962C8B-B14F-4D97-AF65-F5344CB8AC3E}">
-        <p14:creationId xmlns:p14="http://schemas.microsoft.com/office/powerpoint/2010/main" val="555435198"/>
-      </p:ext>
-    </p:extLst>
-  </p:cSld>
-  <p:clrMapOvr>
-    <a:masterClrMapping/>
-  </p:clrMapOvr>
-</p:notes>
-</file>
-
-<file path=ppt/notesSlides/notesSlide4.xml><?xml version="1.0" encoding="utf-8"?>
-<p:notes xmlns:a="http://schemas.openxmlformats.org/drawingml/2006/main" xmlns:r="http://schemas.openxmlformats.org/officeDocument/2006/relationships" xmlns:p="http://schemas.openxmlformats.org/presentationml/2006/main">
-  <p:cSld>
-    <p:spTree>
-      <p:nvGrpSpPr>
-        <p:cNvPr id="1" name=""/>
-        <p:cNvGrpSpPr/>
-        <p:nvPr/>
-      </p:nvGrpSpPr>
-      <p:grpSpPr>
-        <a:xfrm>
-          <a:off x="0" y="0"/>
-          <a:ext cx="0" cy="0"/>
-          <a:chOff x="0" y="0"/>
-          <a:chExt cx="0" cy="0"/>
-        </a:xfrm>
-      </p:grpSpPr>
-      <p:sp>
-        <p:nvSpPr>
-          <p:cNvPr id="2" name="Zástupný symbol pro obrázek snímku 1"/>
-          <p:cNvSpPr>
-            <a:spLocks noGrp="1" noRot="1" noChangeAspect="1"/>
-          </p:cNvSpPr>
-          <p:nvPr>
-            <p:ph type="sldImg"/>
-          </p:nvPr>
-        </p:nvSpPr>
-        <p:spPr/>
-      </p:sp>
-      <p:sp>
-        <p:nvSpPr>
-          <p:cNvPr id="3" name="Zástupný symbol pro poznámky 2"/>
-          <p:cNvSpPr>
-            <a:spLocks noGrp="1"/>
-          </p:cNvSpPr>
-          <p:nvPr>
-            <p:ph type="body" idx="1"/>
-          </p:nvPr>
-        </p:nvSpPr>
-        <p:spPr/>
-        <p:txBody>
-          <a:bodyPr/>
-          <a:lstStyle/>
-          <a:p>
-            <a:r>
-              <a:rPr lang="cs-CZ" u="sng" dirty="0" smtClean="0"/>
-              <a:t>Základní verze</a:t>
-            </a:r>
-            <a:endParaRPr lang="cs-CZ" dirty="0" smtClean="0"/>
-          </a:p>
-          <a:p>
-            <a:r>
-              <a:rPr lang="cs-CZ" dirty="0" smtClean="0"/>
-              <a:t>	Vytvořit systém pro monitoring materiálních a peněžních transakcí, aby měl zákazník přehled o všech transakcích v restauraci, protože je to, podle slov zákazníka i podle našeho mínění, příčina krádeží v hospodě.</a:t>
-            </a:r>
-          </a:p>
-          <a:p>
-            <a:r>
-              <a:rPr lang="cs-CZ" dirty="0" smtClean="0"/>
-              <a:t> </a:t>
-            </a:r>
-          </a:p>
-          <a:p>
-            <a:r>
-              <a:rPr lang="cs-CZ" u="sng" dirty="0" smtClean="0"/>
-              <a:t>Nadstavba</a:t>
-            </a:r>
-            <a:endParaRPr lang="cs-CZ" dirty="0" smtClean="0"/>
-          </a:p>
-          <a:p>
-            <a:r>
-              <a:rPr lang="cs-CZ" dirty="0" smtClean="0"/>
-              <a:t>	Připravit návrh strategie pro zlepšení ziskovosti a také návrh marketingové kampaně, aby měl zákazník plán, jak zlepšit bilanci restaurace, protože je aktuálně ve ztrátě.</a:t>
-            </a:r>
-          </a:p>
-          <a:p>
-            <a:endParaRPr lang="cs-CZ" dirty="0"/>
-          </a:p>
-        </p:txBody>
-      </p:sp>
-      <p:sp>
-        <p:nvSpPr>
-          <p:cNvPr id="4" name="Zástupný symbol pro číslo snímku 3"/>
-          <p:cNvSpPr>
-            <a:spLocks noGrp="1"/>
-          </p:cNvSpPr>
-          <p:nvPr>
-            <p:ph type="sldNum" sz="quarter" idx="10"/>
-          </p:nvPr>
-        </p:nvSpPr>
-        <p:spPr/>
-        <p:txBody>
-          <a:bodyPr/>
-          <a:lstStyle/>
-          <a:p>
-            <a:fld id="{CAA8101A-E4FD-4368-B5ED-4BC9D7603315}" type="slidenum">
-              <a:rPr lang="cs-CZ" smtClean="0"/>
-              <a:t>10</a:t>
-            </a:fld>
-            <a:endParaRPr lang="cs-CZ"/>
-          </a:p>
-        </p:txBody>
-      </p:sp>
-    </p:spTree>
-    <p:extLst>
-      <p:ext uri="{BB962C8B-B14F-4D97-AF65-F5344CB8AC3E}">
-        <p14:creationId xmlns:p14="http://schemas.microsoft.com/office/powerpoint/2010/main" val="3467479921"/>
-      </p:ext>
-    </p:extLst>
-  </p:cSld>
-  <p:clrMapOvr>
-    <a:masterClrMapping/>
-  </p:clrMapOvr>
-</p:notes>
-</file>
-
-<file path=ppt/notesSlides/notesSlide5.xml><?xml version="1.0" encoding="utf-8"?>
-<p:notes xmlns:a="http://schemas.openxmlformats.org/drawingml/2006/main" xmlns:r="http://schemas.openxmlformats.org/officeDocument/2006/relationships" xmlns:p="http://schemas.openxmlformats.org/presentationml/2006/main">
-  <p:cSld>
-    <p:spTree>
-      <p:nvGrpSpPr>
-        <p:cNvPr id="1" name=""/>
-        <p:cNvGrpSpPr/>
-        <p:nvPr/>
-      </p:nvGrpSpPr>
-      <p:grpSpPr>
-        <a:xfrm>
-          <a:off x="0" y="0"/>
-          <a:ext cx="0" cy="0"/>
-          <a:chOff x="0" y="0"/>
-          <a:chExt cx="0" cy="0"/>
-        </a:xfrm>
-      </p:grpSpPr>
-      <p:sp>
-        <p:nvSpPr>
-          <p:cNvPr id="2" name="Zástupný symbol pro obrázek snímku 1"/>
-          <p:cNvSpPr>
-            <a:spLocks noGrp="1" noRot="1" noChangeAspect="1"/>
-          </p:cNvSpPr>
-          <p:nvPr>
-            <p:ph type="sldImg"/>
-          </p:nvPr>
-        </p:nvSpPr>
-        <p:spPr/>
-      </p:sp>
-      <p:sp>
-        <p:nvSpPr>
-          <p:cNvPr id="3" name="Zástupný symbol pro poznámky 2"/>
-          <p:cNvSpPr>
-            <a:spLocks noGrp="1"/>
-          </p:cNvSpPr>
-          <p:nvPr>
-            <p:ph type="body" idx="1"/>
-          </p:nvPr>
-        </p:nvSpPr>
-        <p:spPr/>
-        <p:txBody>
-          <a:bodyPr/>
-          <a:lstStyle/>
-          <a:p>
-            <a:r>
-              <a:rPr lang="cs-CZ" dirty="0" smtClean="0"/>
-              <a:t>Ukázka WIKI, WBS</a:t>
-            </a:r>
-            <a:r>
-              <a:rPr lang="cs-CZ" baseline="0" dirty="0" smtClean="0"/>
-              <a:t> schéma, ?SWOT?, </a:t>
-            </a:r>
-            <a:r>
-              <a:rPr lang="cs-CZ" dirty="0" smtClean="0"/>
-              <a:t>Výkazu</a:t>
-            </a:r>
-            <a:r>
-              <a:rPr lang="cs-CZ" baseline="0" dirty="0" smtClean="0"/>
-              <a:t> práce </a:t>
-            </a:r>
-            <a:endParaRPr lang="cs-CZ" dirty="0"/>
-          </a:p>
-        </p:txBody>
-      </p:sp>
-      <p:sp>
-        <p:nvSpPr>
-          <p:cNvPr id="4" name="Zástupný symbol pro číslo snímku 3"/>
-          <p:cNvSpPr>
-            <a:spLocks noGrp="1"/>
-          </p:cNvSpPr>
-          <p:nvPr>
-            <p:ph type="sldNum" sz="quarter" idx="10"/>
-          </p:nvPr>
-        </p:nvSpPr>
-        <p:spPr/>
-        <p:txBody>
-          <a:bodyPr/>
-          <a:lstStyle/>
-          <a:p>
-            <a:fld id="{CAA8101A-E4FD-4368-B5ED-4BC9D7603315}" type="slidenum">
-              <a:rPr lang="cs-CZ" smtClean="0"/>
-              <a:t>11</a:t>
-            </a:fld>
-            <a:endParaRPr lang="cs-CZ"/>
-          </a:p>
-        </p:txBody>
-      </p:sp>
-    </p:spTree>
-    <p:extLst>
-      <p:ext uri="{BB962C8B-B14F-4D97-AF65-F5344CB8AC3E}">
-        <p14:creationId xmlns:p14="http://schemas.microsoft.com/office/powerpoint/2010/main" val="18992639"/>
-      </p:ext>
-    </p:extLst>
-  </p:cSld>
-  <p:clrMapOvr>
-    <a:masterClrMapping/>
-  </p:clrMapOvr>
-</p:notes>
-</file>
-
 <file path=ppt/slideLayouts/slideLayout1.xml><?xml version="1.0" encoding="utf-8"?>
 <p:sldLayout xmlns:a="http://schemas.openxmlformats.org/drawingml/2006/main" xmlns:r="http://schemas.openxmlformats.org/officeDocument/2006/relationships" xmlns:p="http://schemas.openxmlformats.org/presentationml/2006/main" showMasterSp="0" type="title" preserve="1">
   <p:cSld name="Úvodní snímek">
@@ -1405,7 +310,7 @@
           <a:p>
             <a:fld id="{F14DDEB8-A430-42BF-85AF-B354CDFACA13}" type="datetimeFigureOut">
               <a:rPr lang="cs-CZ" smtClean="0"/>
-              <a:t>20.10.2016</a:t>
+              <a:t>12.10.2016</a:t>
             </a:fld>
             <a:endParaRPr lang="cs-CZ"/>
           </a:p>
@@ -1670,7 +575,7 @@
           <a:p>
             <a:fld id="{F14DDEB8-A430-42BF-85AF-B354CDFACA13}" type="datetimeFigureOut">
               <a:rPr lang="cs-CZ" smtClean="0"/>
-              <a:t>20.10.2016</a:t>
+              <a:t>12.10.2016</a:t>
             </a:fld>
             <a:endParaRPr lang="cs-CZ"/>
           </a:p>
@@ -1845,7 +750,7 @@
           <a:p>
             <a:fld id="{F14DDEB8-A430-42BF-85AF-B354CDFACA13}" type="datetimeFigureOut">
               <a:rPr lang="cs-CZ" smtClean="0"/>
-              <a:t>20.10.2016</a:t>
+              <a:t>12.10.2016</a:t>
             </a:fld>
             <a:endParaRPr lang="cs-CZ"/>
           </a:p>
@@ -2010,7 +915,7 @@
           <a:p>
             <a:fld id="{F14DDEB8-A430-42BF-85AF-B354CDFACA13}" type="datetimeFigureOut">
               <a:rPr lang="cs-CZ" smtClean="0"/>
-              <a:t>20.10.2016</a:t>
+              <a:t>12.10.2016</a:t>
             </a:fld>
             <a:endParaRPr lang="cs-CZ"/>
           </a:p>
@@ -2259,7 +1164,7 @@
           <a:p>
             <a:fld id="{F14DDEB8-A430-42BF-85AF-B354CDFACA13}" type="datetimeFigureOut">
               <a:rPr lang="cs-CZ" smtClean="0"/>
-              <a:t>20.10.2016</a:t>
+              <a:t>12.10.2016</a:t>
             </a:fld>
             <a:endParaRPr lang="cs-CZ"/>
           </a:p>
@@ -2542,7 +1447,7 @@
           <a:p>
             <a:fld id="{F14DDEB8-A430-42BF-85AF-B354CDFACA13}" type="datetimeFigureOut">
               <a:rPr lang="cs-CZ" smtClean="0"/>
-              <a:t>20.10.2016</a:t>
+              <a:t>12.10.2016</a:t>
             </a:fld>
             <a:endParaRPr lang="cs-CZ"/>
           </a:p>
@@ -2981,7 +1886,7 @@
           <a:p>
             <a:fld id="{F14DDEB8-A430-42BF-85AF-B354CDFACA13}" type="datetimeFigureOut">
               <a:rPr lang="cs-CZ" smtClean="0"/>
-              <a:t>20.10.2016</a:t>
+              <a:t>12.10.2016</a:t>
             </a:fld>
             <a:endParaRPr lang="cs-CZ"/>
           </a:p>
@@ -3094,7 +1999,7 @@
           <a:p>
             <a:fld id="{F14DDEB8-A430-42BF-85AF-B354CDFACA13}" type="datetimeFigureOut">
               <a:rPr lang="cs-CZ" smtClean="0"/>
-              <a:t>20.10.2016</a:t>
+              <a:t>12.10.2016</a:t>
             </a:fld>
             <a:endParaRPr lang="cs-CZ"/>
           </a:p>
@@ -3184,7 +2089,7 @@
           <a:p>
             <a:fld id="{F14DDEB8-A430-42BF-85AF-B354CDFACA13}" type="datetimeFigureOut">
               <a:rPr lang="cs-CZ" smtClean="0"/>
-              <a:t>20.10.2016</a:t>
+              <a:t>12.10.2016</a:t>
             </a:fld>
             <a:endParaRPr lang="cs-CZ"/>
           </a:p>
@@ -3426,7 +2331,7 @@
           <a:p>
             <a:fld id="{F14DDEB8-A430-42BF-85AF-B354CDFACA13}" type="datetimeFigureOut">
               <a:rPr lang="cs-CZ" smtClean="0"/>
-              <a:t>20.10.2016</a:t>
+              <a:t>12.10.2016</a:t>
             </a:fld>
             <a:endParaRPr lang="cs-CZ"/>
           </a:p>
@@ -3720,7 +2625,7 @@
           <a:p>
             <a:fld id="{F14DDEB8-A430-42BF-85AF-B354CDFACA13}" type="datetimeFigureOut">
               <a:rPr lang="cs-CZ" smtClean="0"/>
-              <a:t>20.10.2016</a:t>
+              <a:t>12.10.2016</a:t>
             </a:fld>
             <a:endParaRPr lang="cs-CZ"/>
           </a:p>
@@ -4014,7 +2919,7 @@
           <a:p>
             <a:fld id="{F14DDEB8-A430-42BF-85AF-B354CDFACA13}" type="datetimeFigureOut">
               <a:rPr lang="cs-CZ" smtClean="0"/>
-              <a:t>20.10.2016</a:t>
+              <a:t>12.10.2016</a:t>
             </a:fld>
             <a:endParaRPr lang="cs-CZ"/>
           </a:p>
@@ -4615,7 +3520,7 @@
           <a:p>
             <a:r>
               <a:rPr lang="cs-CZ" dirty="0" smtClean="0"/>
-              <a:t>cíle</a:t>
+              <a:t>zdroje</a:t>
             </a:r>
             <a:endParaRPr lang="cs-CZ" dirty="0"/>
           </a:p>
@@ -4623,78 +3528,75 @@
       </p:sp>
       <p:sp>
         <p:nvSpPr>
-          <p:cNvPr id="4" name="Obdélník 3"/>
-          <p:cNvSpPr/>
+          <p:cNvPr id="3" name="TextovéPole 2"/>
+          <p:cNvSpPr txBox="1"/>
           <p:nvPr/>
         </p:nvSpPr>
         <p:spPr>
           <a:xfrm>
-            <a:off x="513341" y="1844824"/>
-            <a:ext cx="7920880" cy="2308324"/>
+            <a:off x="467544" y="1700808"/>
+            <a:ext cx="7920880" cy="1754326"/>
           </a:xfrm>
           <a:prstGeom prst="rect">
             <a:avLst/>
           </a:prstGeom>
+          <a:noFill/>
         </p:spPr>
         <p:txBody>
-          <a:bodyPr wrap="square">
+          <a:bodyPr wrap="square" rtlCol="0">
             <a:spAutoFit/>
           </a:bodyPr>
           <a:lstStyle/>
           <a:p>
-            <a:r>
-              <a:rPr lang="cs-CZ" b="1" dirty="0"/>
-              <a:t>Základní </a:t>
-            </a:r>
-            <a:r>
-              <a:rPr lang="cs-CZ" b="1" dirty="0" smtClean="0"/>
-              <a:t>verze</a:t>
-            </a:r>
-          </a:p>
-          <a:p>
-            <a:endParaRPr lang="cs-CZ" dirty="0"/>
-          </a:p>
-          <a:p>
-            <a:pPr marL="742950" lvl="1" indent="-285750">
+            <a:pPr marL="285750" indent="-285750">
               <a:buFont typeface="Arial" panose="020B0604020202020204" pitchFamily="34" charset="0"/>
               <a:buChar char="•"/>
             </a:pPr>
             <a:r>
-              <a:rPr lang="cs-CZ" dirty="0" smtClean="0"/>
-              <a:t>vytvoření systému pro monitoring materiálních a peněžních transakcí</a:t>
-            </a:r>
-          </a:p>
-          <a:p>
-            <a:endParaRPr lang="cs-CZ" b="1" dirty="0" smtClean="0"/>
-          </a:p>
-          <a:p>
-            <a:r>
-              <a:rPr lang="cs-CZ" b="1" dirty="0" smtClean="0"/>
-              <a:t>Nadstavba</a:t>
-            </a:r>
-          </a:p>
-          <a:p>
-            <a:endParaRPr lang="cs-CZ" dirty="0"/>
-          </a:p>
-          <a:p>
-            <a:pPr marL="742950" lvl="1" indent="-285750">
+              <a:rPr lang="cs-CZ" dirty="0"/>
+              <a:t>TEAM Banner: </a:t>
+            </a:r>
+            <a:r>
+              <a:rPr lang="cs-CZ" dirty="0">
+                <a:hlinkClick r:id="rId2"/>
+              </a:rPr>
+              <a:t>http://</a:t>
+            </a:r>
+            <a:r>
+              <a:rPr lang="cs-CZ" dirty="0" smtClean="0">
+                <a:hlinkClick r:id="rId2"/>
+              </a:rPr>
+              <a:t>vorkspace.com/blog/wp-content/uploads/TEAMbanner.jpg</a:t>
+            </a:r>
+            <a:r>
+              <a:rPr lang="cs-CZ" dirty="0"/>
+              <a:t/>
+            </a:r>
+            <a:br>
+              <a:rPr lang="cs-CZ" dirty="0"/>
+            </a:br>
+            <a:endParaRPr lang="cs-CZ" dirty="0" smtClean="0"/>
+          </a:p>
+          <a:p>
+            <a:pPr marL="285750" indent="-285750">
               <a:buFont typeface="Arial" panose="020B0604020202020204" pitchFamily="34" charset="0"/>
               <a:buChar char="•"/>
             </a:pPr>
             <a:r>
               <a:rPr lang="cs-CZ" dirty="0" smtClean="0"/>
-              <a:t>návrh strategie pro zlepšení ziskovosti</a:t>
-            </a:r>
-            <a:endParaRPr lang="cs-CZ" dirty="0"/>
-          </a:p>
-          <a:p>
-            <a:pPr marL="742950" lvl="1" indent="-285750">
-              <a:buFont typeface="Arial" panose="020B0604020202020204" pitchFamily="34" charset="0"/>
-              <a:buChar char="•"/>
-            </a:pPr>
-            <a:r>
-              <a:rPr lang="cs-CZ" dirty="0" smtClean="0"/>
-              <a:t>návrh marketingové kampaně</a:t>
+              <a:t>ZÁPIS ze schůzky: </a:t>
+            </a:r>
+            <a:r>
+              <a:rPr lang="cs-CZ" dirty="0" smtClean="0">
+                <a:hlinkClick r:id="rId3"/>
+              </a:rPr>
+              <a:t>https</a:t>
+            </a:r>
+            <a:r>
+              <a:rPr lang="cs-CZ" dirty="0">
+                <a:hlinkClick r:id="rId3"/>
+              </a:rPr>
+              <a:t>://gitlab.fel.cvut.cz/B161_B6B36ZPR/105_Hospoda/blob/master/Z%C3%A1pis_z_1_sch%C5%AFzky.doc</a:t>
             </a:r>
             <a:endParaRPr lang="cs-CZ" dirty="0"/>
           </a:p>
@@ -4703,7 +3605,7 @@
     </p:spTree>
     <p:extLst>
       <p:ext uri="{BB962C8B-B14F-4D97-AF65-F5344CB8AC3E}">
-        <p14:creationId xmlns:p14="http://schemas.microsoft.com/office/powerpoint/2010/main" val="4255122470"/>
+        <p14:creationId xmlns:p14="http://schemas.microsoft.com/office/powerpoint/2010/main" val="640073309"/>
       </p:ext>
     </p:extLst>
   </p:cSld>
@@ -4737,33 +3639,10 @@
           <a:chExt cx="0" cy="0"/>
         </a:xfrm>
       </p:grpSpPr>
-      <p:sp>
-        <p:nvSpPr>
-          <p:cNvPr id="2" name="Nadpis 1"/>
-          <p:cNvSpPr>
-            <a:spLocks noGrp="1"/>
-          </p:cNvSpPr>
-          <p:nvPr>
-            <p:ph type="title"/>
-          </p:nvPr>
-        </p:nvSpPr>
-        <p:spPr/>
-        <p:txBody>
-          <a:bodyPr/>
-          <a:lstStyle/>
-          <a:p>
-            <a:r>
-              <a:rPr lang="cs-CZ" dirty="0" smtClean="0"/>
-              <a:t>Ukázka práce</a:t>
-            </a:r>
-            <a:endParaRPr lang="cs-CZ" dirty="0"/>
-          </a:p>
-        </p:txBody>
-      </p:sp>
     </p:spTree>
     <p:extLst>
       <p:ext uri="{BB962C8B-B14F-4D97-AF65-F5344CB8AC3E}">
-        <p14:creationId xmlns:p14="http://schemas.microsoft.com/office/powerpoint/2010/main" val="102369439"/>
+        <p14:creationId xmlns:p14="http://schemas.microsoft.com/office/powerpoint/2010/main" val="2695329968"/>
       </p:ext>
     </p:extLst>
   </p:cSld>
@@ -4780,7 +3659,1164 @@
 </p:sld>
 </file>
 
-<file path=ppt/slides/slide12.xml><?xml version="1.0" encoding="utf-8"?>
+<file path=ppt/slides/slide2.xml><?xml version="1.0" encoding="utf-8"?>
+<p:sld xmlns:a="http://schemas.openxmlformats.org/drawingml/2006/main" xmlns:r="http://schemas.openxmlformats.org/officeDocument/2006/relationships" xmlns:p="http://schemas.openxmlformats.org/presentationml/2006/main">
+  <p:cSld>
+    <p:spTree>
+      <p:nvGrpSpPr>
+        <p:cNvPr id="1" name=""/>
+        <p:cNvGrpSpPr/>
+        <p:nvPr/>
+      </p:nvGrpSpPr>
+      <p:grpSpPr>
+        <a:xfrm>
+          <a:off x="0" y="0"/>
+          <a:ext cx="0" cy="0"/>
+          <a:chOff x="0" y="0"/>
+          <a:chExt cx="0" cy="0"/>
+        </a:xfrm>
+      </p:grpSpPr>
+      <p:sp>
+        <p:nvSpPr>
+          <p:cNvPr id="2" name="Nadpis 1"/>
+          <p:cNvSpPr>
+            <a:spLocks noGrp="1"/>
+          </p:cNvSpPr>
+          <p:nvPr>
+            <p:ph type="title"/>
+          </p:nvPr>
+        </p:nvSpPr>
+        <p:spPr/>
+        <p:txBody>
+          <a:bodyPr/>
+          <a:lstStyle/>
+          <a:p>
+            <a:r>
+              <a:rPr lang="cs-CZ" dirty="0" smtClean="0"/>
+              <a:t>složení teamu</a:t>
+            </a:r>
+            <a:endParaRPr lang="cs-CZ" dirty="0"/>
+          </a:p>
+        </p:txBody>
+      </p:sp>
+      <p:pic>
+        <p:nvPicPr>
+          <p:cNvPr id="1026" name="Picture 2" descr="https://scontent-ams3-1.xx.fbcdn.net/v/t1.0-9/12507114_10201322110370821_4356863718856974381_n.jpg?oh=ed3e9b18292a6c362081a749795c97a0&amp;oe=58635E66"/>
+          <p:cNvPicPr>
+            <a:picLocks noChangeAspect="1" noChangeArrowheads="1"/>
+          </p:cNvPicPr>
+          <p:nvPr/>
+        </p:nvPicPr>
+        <p:blipFill>
+          <a:blip r:embed="rId2" cstate="print">
+            <a:extLst>
+              <a:ext uri="{28A0092B-C50C-407E-A947-70E740481C1C}">
+                <a14:useLocalDpi xmlns:a14="http://schemas.microsoft.com/office/drawing/2010/main" val="0"/>
+              </a:ext>
+            </a:extLst>
+          </a:blip>
+          <a:srcRect/>
+          <a:stretch>
+            <a:fillRect/>
+          </a:stretch>
+        </p:blipFill>
+        <p:spPr bwMode="auto">
+          <a:xfrm>
+            <a:off x="395536" y="1772816"/>
+            <a:ext cx="1896852" cy="1896853"/>
+          </a:xfrm>
+          <a:prstGeom prst="rect">
+            <a:avLst/>
+          </a:prstGeom>
+          <a:noFill/>
+          <a:extLst>
+            <a:ext uri="{909E8E84-426E-40DD-AFC4-6F175D3DCCD1}">
+              <a14:hiddenFill xmlns:a14="http://schemas.microsoft.com/office/drawing/2010/main">
+                <a:solidFill>
+                  <a:srgbClr val="FFFFFF"/>
+                </a:solidFill>
+              </a14:hiddenFill>
+            </a:ext>
+          </a:extLst>
+        </p:spPr>
+      </p:pic>
+      <p:pic>
+        <p:nvPicPr>
+          <p:cNvPr id="1028" name="Picture 4" descr="https://scontent-ams3-1.xx.fbcdn.net/v/t1.0-9/12096209_1066468200039064_4469502373139831546_n.jpg?oh=effe2f692c17c07291a264f18f762977&amp;oe=586686AF"/>
+          <p:cNvPicPr>
+            <a:picLocks noChangeAspect="1" noChangeArrowheads="1"/>
+          </p:cNvPicPr>
+          <p:nvPr/>
+        </p:nvPicPr>
+        <p:blipFill>
+          <a:blip r:embed="rId3" cstate="print">
+            <a:extLst>
+              <a:ext uri="{28A0092B-C50C-407E-A947-70E740481C1C}">
+                <a14:useLocalDpi xmlns:a14="http://schemas.microsoft.com/office/drawing/2010/main" val="0"/>
+              </a:ext>
+            </a:extLst>
+          </a:blip>
+          <a:srcRect/>
+          <a:stretch>
+            <a:fillRect/>
+          </a:stretch>
+        </p:blipFill>
+        <p:spPr bwMode="auto">
+          <a:xfrm>
+            <a:off x="2378855" y="1772816"/>
+            <a:ext cx="1905113" cy="1905113"/>
+          </a:xfrm>
+          <a:prstGeom prst="rect">
+            <a:avLst/>
+          </a:prstGeom>
+          <a:noFill/>
+          <a:extLst>
+            <a:ext uri="{909E8E84-426E-40DD-AFC4-6F175D3DCCD1}">
+              <a14:hiddenFill xmlns:a14="http://schemas.microsoft.com/office/drawing/2010/main">
+                <a:solidFill>
+                  <a:srgbClr val="FFFFFF"/>
+                </a:solidFill>
+              </a14:hiddenFill>
+            </a:ext>
+          </a:extLst>
+        </p:spPr>
+      </p:pic>
+      <p:pic>
+        <p:nvPicPr>
+          <p:cNvPr id="1030" name="Picture 6" descr="https://scontent-ams3-1.xx.fbcdn.net/v/t1.0-9/10435004_10202356002090853_335496423139343010_n.jpg?oh=a09ee0d7aefca9d08bdad1475ae0aec4&amp;oe=58A3A661"/>
+          <p:cNvPicPr>
+            <a:picLocks noChangeAspect="1" noChangeArrowheads="1"/>
+          </p:cNvPicPr>
+          <p:nvPr/>
+        </p:nvPicPr>
+        <p:blipFill>
+          <a:blip r:embed="rId4" cstate="print">
+            <a:extLst>
+              <a:ext uri="{28A0092B-C50C-407E-A947-70E740481C1C}">
+                <a14:useLocalDpi xmlns:a14="http://schemas.microsoft.com/office/drawing/2010/main" val="0"/>
+              </a:ext>
+            </a:extLst>
+          </a:blip>
+          <a:srcRect/>
+          <a:stretch>
+            <a:fillRect/>
+          </a:stretch>
+        </p:blipFill>
+        <p:spPr bwMode="auto">
+          <a:xfrm>
+            <a:off x="4355976" y="1781394"/>
+            <a:ext cx="2088232" cy="1913551"/>
+          </a:xfrm>
+          <a:prstGeom prst="rect">
+            <a:avLst/>
+          </a:prstGeom>
+          <a:noFill/>
+          <a:extLst>
+            <a:ext uri="{909E8E84-426E-40DD-AFC4-6F175D3DCCD1}">
+              <a14:hiddenFill xmlns:a14="http://schemas.microsoft.com/office/drawing/2010/main">
+                <a:solidFill>
+                  <a:srgbClr val="FFFFFF"/>
+                </a:solidFill>
+              </a14:hiddenFill>
+            </a:ext>
+          </a:extLst>
+        </p:spPr>
+      </p:pic>
+      <p:pic>
+        <p:nvPicPr>
+          <p:cNvPr id="1032" name="Picture 8" descr="https://scontent-ams3-1.xx.fbcdn.net/v/t34.0-12/14694678_1078032382312342_505770293_n.jpg?oh=9f1db0b4d6f8f06843c0fdc8421df65d&amp;oe=58004017"/>
+          <p:cNvPicPr>
+            <a:picLocks noChangeAspect="1" noChangeArrowheads="1"/>
+          </p:cNvPicPr>
+          <p:nvPr/>
+        </p:nvPicPr>
+        <p:blipFill>
+          <a:blip r:embed="rId5">
+            <a:extLst>
+              <a:ext uri="{28A0092B-C50C-407E-A947-70E740481C1C}">
+                <a14:useLocalDpi xmlns:a14="http://schemas.microsoft.com/office/drawing/2010/main" val="0"/>
+              </a:ext>
+            </a:extLst>
+          </a:blip>
+          <a:srcRect/>
+          <a:stretch>
+            <a:fillRect/>
+          </a:stretch>
+        </p:blipFill>
+        <p:spPr bwMode="auto">
+          <a:xfrm>
+            <a:off x="6555321" y="1759938"/>
+            <a:ext cx="1905111" cy="1905112"/>
+          </a:xfrm>
+          <a:prstGeom prst="rect">
+            <a:avLst/>
+          </a:prstGeom>
+          <a:noFill/>
+          <a:extLst>
+            <a:ext uri="{909E8E84-426E-40DD-AFC4-6F175D3DCCD1}">
+              <a14:hiddenFill xmlns:a14="http://schemas.microsoft.com/office/drawing/2010/main">
+                <a:solidFill>
+                  <a:srgbClr val="FFFFFF"/>
+                </a:solidFill>
+              </a14:hiddenFill>
+            </a:ext>
+          </a:extLst>
+        </p:spPr>
+      </p:pic>
+      <p:sp>
+        <p:nvSpPr>
+          <p:cNvPr id="3" name="TextovéPole 2"/>
+          <p:cNvSpPr txBox="1"/>
+          <p:nvPr/>
+        </p:nvSpPr>
+        <p:spPr>
+          <a:xfrm>
+            <a:off x="395536" y="3861048"/>
+            <a:ext cx="1896852" cy="2246769"/>
+          </a:xfrm>
+          <a:prstGeom prst="rect">
+            <a:avLst/>
+          </a:prstGeom>
+          <a:noFill/>
+        </p:spPr>
+        <p:txBody>
+          <a:bodyPr wrap="square" rtlCol="0">
+            <a:spAutoFit/>
+          </a:bodyPr>
+          <a:lstStyle/>
+          <a:p>
+            <a:r>
+              <a:rPr lang="cs-CZ" sz="1400" dirty="0"/>
+              <a:t>Ahoj, mé jméno je Jakub Hruška, je mi 21 let a pocházím z </a:t>
+            </a:r>
+            <a:r>
+              <a:rPr lang="cs-CZ" sz="1400" dirty="0" smtClean="0"/>
+              <a:t>Třebíče. Mým </a:t>
+            </a:r>
+            <a:r>
+              <a:rPr lang="cs-CZ" sz="1400" dirty="0"/>
+              <a:t>profesním koníčkem jsou </a:t>
+            </a:r>
+            <a:r>
+              <a:rPr lang="cs-CZ" sz="1400" dirty="0"/>
+              <a:t>databáze a datová </a:t>
+            </a:r>
+            <a:r>
+              <a:rPr lang="cs-CZ" sz="1400" dirty="0"/>
+              <a:t>analýza. V </a:t>
+            </a:r>
+            <a:r>
+              <a:rPr lang="cs-CZ" sz="1400" dirty="0"/>
+              <a:t>našem týmu </a:t>
+            </a:r>
+            <a:r>
+              <a:rPr lang="cs-CZ" sz="1400" dirty="0" smtClean="0"/>
+              <a:t>zastávám roli </a:t>
+            </a:r>
+            <a:r>
+              <a:rPr lang="cs-CZ" sz="1400" dirty="0"/>
+              <a:t>Formovače/Analytika.</a:t>
+            </a:r>
+            <a:endParaRPr lang="cs-CZ" sz="1400" dirty="0"/>
+          </a:p>
+        </p:txBody>
+      </p:sp>
+      <p:sp>
+        <p:nvSpPr>
+          <p:cNvPr id="8" name="TextovéPole 7"/>
+          <p:cNvSpPr txBox="1"/>
+          <p:nvPr/>
+        </p:nvSpPr>
+        <p:spPr>
+          <a:xfrm>
+            <a:off x="2378855" y="3861048"/>
+            <a:ext cx="1896852" cy="2246769"/>
+          </a:xfrm>
+          <a:prstGeom prst="rect">
+            <a:avLst/>
+          </a:prstGeom>
+          <a:noFill/>
+        </p:spPr>
+        <p:txBody>
+          <a:bodyPr wrap="square" rtlCol="0">
+            <a:spAutoFit/>
+          </a:bodyPr>
+          <a:lstStyle/>
+          <a:p>
+            <a:r>
+              <a:rPr lang="cs-CZ" sz="1400" dirty="0"/>
+              <a:t>Jmenuji se Jakub Kučera. Je mi 20 let a bydlím v malé vesničce blízko Berouna. Mezi mé záliby patří multimediální tvorba. Má role v našem </a:t>
+            </a:r>
+            <a:r>
+              <a:rPr lang="cs-CZ" sz="1400" dirty="0" smtClean="0"/>
+              <a:t>teamu </a:t>
+            </a:r>
+            <a:r>
+              <a:rPr lang="cs-CZ" sz="1400" dirty="0"/>
+              <a:t>je </a:t>
+            </a:r>
+            <a:r>
+              <a:rPr lang="cs-CZ" sz="1400" dirty="0" err="1"/>
+              <a:t>Stmelovač</a:t>
+            </a:r>
+            <a:r>
+              <a:rPr lang="cs-CZ" sz="1400" dirty="0"/>
+              <a:t> / Inovátor.</a:t>
+            </a:r>
+            <a:endParaRPr lang="cs-CZ" sz="1400" dirty="0"/>
+          </a:p>
+        </p:txBody>
+      </p:sp>
+      <p:sp>
+        <p:nvSpPr>
+          <p:cNvPr id="9" name="TextovéPole 8"/>
+          <p:cNvSpPr txBox="1"/>
+          <p:nvPr/>
+        </p:nvSpPr>
+        <p:spPr>
+          <a:xfrm>
+            <a:off x="4355976" y="3861048"/>
+            <a:ext cx="2088232" cy="2462213"/>
+          </a:xfrm>
+          <a:prstGeom prst="rect">
+            <a:avLst/>
+          </a:prstGeom>
+          <a:noFill/>
+        </p:spPr>
+        <p:txBody>
+          <a:bodyPr wrap="square" rtlCol="0">
+            <a:spAutoFit/>
+          </a:bodyPr>
+          <a:lstStyle/>
+          <a:p>
+            <a:r>
+              <a:rPr lang="cs-CZ" sz="1400" dirty="0"/>
+              <a:t>Moje jméno je Michal Koreš. Je mi 22 let a jsem z vesnice blízko Tábora. Mezi moje koníčky patří četba, hraní video her a jsem také nadšeným fanouškem do </a:t>
+            </a:r>
+            <a:r>
+              <a:rPr lang="cs-CZ" sz="1400" dirty="0" err="1"/>
+              <a:t>Geocachingu</a:t>
+            </a:r>
+            <a:r>
+              <a:rPr lang="cs-CZ" sz="1400" dirty="0"/>
+              <a:t>. Moje role v týmu </a:t>
+            </a:r>
+            <a:r>
+              <a:rPr lang="cs-CZ" sz="1400" dirty="0" smtClean="0"/>
+              <a:t>jsou Realizátor /Specialista</a:t>
+            </a:r>
+            <a:r>
+              <a:rPr lang="cs-CZ" sz="1400" dirty="0"/>
+              <a:t>.</a:t>
+            </a:r>
+            <a:endParaRPr lang="cs-CZ" sz="1400" dirty="0"/>
+          </a:p>
+        </p:txBody>
+      </p:sp>
+      <p:sp>
+        <p:nvSpPr>
+          <p:cNvPr id="10" name="TextovéPole 9"/>
+          <p:cNvSpPr txBox="1"/>
+          <p:nvPr/>
+        </p:nvSpPr>
+        <p:spPr>
+          <a:xfrm>
+            <a:off x="6463760" y="3835896"/>
+            <a:ext cx="2088232" cy="2031325"/>
+          </a:xfrm>
+          <a:prstGeom prst="rect">
+            <a:avLst/>
+          </a:prstGeom>
+          <a:noFill/>
+        </p:spPr>
+        <p:txBody>
+          <a:bodyPr wrap="square" rtlCol="0">
+            <a:spAutoFit/>
+          </a:bodyPr>
+          <a:lstStyle/>
+          <a:p>
+            <a:r>
+              <a:rPr lang="cs-CZ" sz="1400" dirty="0"/>
+              <a:t>Ahoj, mé jméno je Konstantin </a:t>
+            </a:r>
+            <a:r>
+              <a:rPr lang="cs-CZ" sz="1400" dirty="0" err="1"/>
+              <a:t>Kožokar</a:t>
+            </a:r>
+            <a:r>
+              <a:rPr lang="cs-CZ" sz="1400" dirty="0"/>
+              <a:t>, je mi 20 let a pocházím z </a:t>
+            </a:r>
+            <a:r>
+              <a:rPr lang="cs-CZ" sz="1400" dirty="0" err="1"/>
+              <a:t>Talina</a:t>
+            </a:r>
+            <a:r>
+              <a:rPr lang="cs-CZ" sz="1400" dirty="0"/>
+              <a:t>(Estonsko). Pracují jako </a:t>
+            </a:r>
+            <a:r>
+              <a:rPr lang="cs-CZ" sz="1400" dirty="0" err="1"/>
+              <a:t>backend</a:t>
+            </a:r>
+            <a:r>
+              <a:rPr lang="cs-CZ" sz="1400" dirty="0"/>
+              <a:t> PHP developer. V našem týmu zastávám roli Specialisty. Rád hraju šachy, programují.</a:t>
+            </a:r>
+            <a:endParaRPr lang="cs-CZ" sz="1400" dirty="0"/>
+          </a:p>
+        </p:txBody>
+      </p:sp>
+    </p:spTree>
+    <p:extLst>
+      <p:ext uri="{BB962C8B-B14F-4D97-AF65-F5344CB8AC3E}">
+        <p14:creationId xmlns:p14="http://schemas.microsoft.com/office/powerpoint/2010/main" val="4091554335"/>
+      </p:ext>
+    </p:extLst>
+  </p:cSld>
+  <p:clrMapOvr>
+    <a:masterClrMapping/>
+  </p:clrMapOvr>
+  <p:timing>
+    <p:tnLst>
+      <p:par>
+        <p:cTn id="1" dur="indefinite" restart="never" nodeType="tmRoot"/>
+      </p:par>
+    </p:tnLst>
+  </p:timing>
+</p:sld>
+</file>
+
+<file path=ppt/slides/slide3.xml><?xml version="1.0" encoding="utf-8"?>
+<p:sld xmlns:a="http://schemas.openxmlformats.org/drawingml/2006/main" xmlns:r="http://schemas.openxmlformats.org/officeDocument/2006/relationships" xmlns:p="http://schemas.openxmlformats.org/presentationml/2006/main">
+  <p:cSld>
+    <p:spTree>
+      <p:nvGrpSpPr>
+        <p:cNvPr id="1" name=""/>
+        <p:cNvGrpSpPr/>
+        <p:nvPr/>
+      </p:nvGrpSpPr>
+      <p:grpSpPr>
+        <a:xfrm>
+          <a:off x="0" y="0"/>
+          <a:ext cx="0" cy="0"/>
+          <a:chOff x="0" y="0"/>
+          <a:chExt cx="0" cy="0"/>
+        </a:xfrm>
+      </p:grpSpPr>
+      <p:sp>
+        <p:nvSpPr>
+          <p:cNvPr id="2" name="Nadpis 1"/>
+          <p:cNvSpPr>
+            <a:spLocks noGrp="1"/>
+          </p:cNvSpPr>
+          <p:nvPr>
+            <p:ph type="title"/>
+          </p:nvPr>
+        </p:nvSpPr>
+        <p:spPr/>
+        <p:txBody>
+          <a:bodyPr/>
+          <a:lstStyle/>
+          <a:p>
+            <a:r>
+              <a:rPr lang="cs-CZ" dirty="0" smtClean="0"/>
+              <a:t>zadání</a:t>
+            </a:r>
+            <a:endParaRPr lang="cs-CZ" dirty="0"/>
+          </a:p>
+        </p:txBody>
+      </p:sp>
+      <p:sp>
+        <p:nvSpPr>
+          <p:cNvPr id="3" name="TextovéPole 2"/>
+          <p:cNvSpPr txBox="1"/>
+          <p:nvPr/>
+        </p:nvSpPr>
+        <p:spPr>
+          <a:xfrm>
+            <a:off x="467544" y="1840756"/>
+            <a:ext cx="7272808" cy="2862322"/>
+          </a:xfrm>
+          <a:prstGeom prst="rect">
+            <a:avLst/>
+          </a:prstGeom>
+          <a:noFill/>
+        </p:spPr>
+        <p:txBody>
+          <a:bodyPr wrap="square" rtlCol="0">
+            <a:spAutoFit/>
+          </a:bodyPr>
+          <a:lstStyle/>
+          <a:p>
+            <a:r>
+              <a:rPr lang="cs-CZ" dirty="0">
+                <a:latin typeface="+mj-lt"/>
+              </a:rPr>
+              <a:t>Hospoda, kde se ztrácejí </a:t>
+            </a:r>
+            <a:r>
+              <a:rPr lang="cs-CZ" dirty="0" smtClean="0">
+                <a:latin typeface="+mj-lt"/>
+              </a:rPr>
+              <a:t>peníze</a:t>
+            </a:r>
+            <a:br>
+              <a:rPr lang="cs-CZ" dirty="0" smtClean="0">
+                <a:latin typeface="+mj-lt"/>
+              </a:rPr>
+            </a:br>
+            <a:endParaRPr lang="cs-CZ" dirty="0">
+              <a:latin typeface="+mj-lt"/>
+            </a:endParaRPr>
+          </a:p>
+          <a:p>
+            <a:r>
+              <a:rPr lang="cs-CZ" dirty="0"/>
+              <a:t>Cílem projektu je vyřešit situaci v restauraci s 50 místy, která bývá zaplněna z 50%. Majiteli se zdá, že ho zaměstnanci okrádají. </a:t>
+            </a:r>
+            <a:r>
+              <a:rPr lang="cs-CZ" dirty="0"/>
+              <a:t>Majitel je v hospodě málokdy (má své jiné zaměstnání), v hospodě se nevede žádná lepší evidence</a:t>
+            </a:r>
+            <a:r>
+              <a:rPr lang="cs-CZ" dirty="0" smtClean="0"/>
+              <a:t>.</a:t>
+            </a:r>
+            <a:br>
+              <a:rPr lang="cs-CZ" dirty="0" smtClean="0"/>
+            </a:br>
+            <a:endParaRPr lang="cs-CZ" dirty="0"/>
+          </a:p>
+          <a:p>
+            <a:pPr marL="285750" indent="-285750">
+              <a:buFont typeface="Arial" panose="020B0604020202020204" pitchFamily="34" charset="0"/>
+              <a:buChar char="•"/>
+            </a:pPr>
+            <a:r>
+              <a:rPr lang="cs-CZ" dirty="0"/>
+              <a:t>Majitel by rád věděl co se v restauraci s penězi děje.</a:t>
+            </a:r>
+          </a:p>
+          <a:p>
+            <a:pPr marL="285750" indent="-285750">
+              <a:buFont typeface="Arial" panose="020B0604020202020204" pitchFamily="34" charset="0"/>
+              <a:buChar char="•"/>
+            </a:pPr>
+            <a:r>
+              <a:rPr lang="cs-CZ" dirty="0"/>
+              <a:t>Rád by slyšel návrhy co a jak se má stát.</a:t>
+            </a:r>
+          </a:p>
+          <a:p>
+            <a:endParaRPr lang="cs-CZ" dirty="0"/>
+          </a:p>
+        </p:txBody>
+      </p:sp>
+    </p:spTree>
+    <p:extLst>
+      <p:ext uri="{BB962C8B-B14F-4D97-AF65-F5344CB8AC3E}">
+        <p14:creationId xmlns:p14="http://schemas.microsoft.com/office/powerpoint/2010/main" val="157906160"/>
+      </p:ext>
+    </p:extLst>
+  </p:cSld>
+  <p:clrMapOvr>
+    <a:masterClrMapping/>
+  </p:clrMapOvr>
+  <p:timing>
+    <p:tnLst>
+      <p:par>
+        <p:cTn id="1" dur="indefinite" restart="never" nodeType="tmRoot"/>
+      </p:par>
+    </p:tnLst>
+  </p:timing>
+</p:sld>
+</file>
+
+<file path=ppt/slides/slide4.xml><?xml version="1.0" encoding="utf-8"?>
+<p:sld xmlns:a="http://schemas.openxmlformats.org/drawingml/2006/main" xmlns:r="http://schemas.openxmlformats.org/officeDocument/2006/relationships" xmlns:p="http://schemas.openxmlformats.org/presentationml/2006/main">
+  <p:cSld>
+    <p:spTree>
+      <p:nvGrpSpPr>
+        <p:cNvPr id="1" name=""/>
+        <p:cNvGrpSpPr/>
+        <p:nvPr/>
+      </p:nvGrpSpPr>
+      <p:grpSpPr>
+        <a:xfrm>
+          <a:off x="0" y="0"/>
+          <a:ext cx="0" cy="0"/>
+          <a:chOff x="0" y="0"/>
+          <a:chExt cx="0" cy="0"/>
+        </a:xfrm>
+      </p:grpSpPr>
+      <p:sp>
+        <p:nvSpPr>
+          <p:cNvPr id="2" name="Nadpis 1"/>
+          <p:cNvSpPr>
+            <a:spLocks noGrp="1"/>
+          </p:cNvSpPr>
+          <p:nvPr>
+            <p:ph type="title"/>
+          </p:nvPr>
+        </p:nvSpPr>
+        <p:spPr/>
+        <p:txBody>
+          <a:bodyPr/>
+          <a:lstStyle/>
+          <a:p>
+            <a:r>
+              <a:rPr lang="cs-CZ" dirty="0" smtClean="0"/>
+              <a:t>SANDBOX</a:t>
+            </a:r>
+            <a:endParaRPr lang="cs-CZ" dirty="0"/>
+          </a:p>
+        </p:txBody>
+      </p:sp>
+      <p:pic>
+        <p:nvPicPr>
+          <p:cNvPr id="3" name="Obrázek 2"/>
+          <p:cNvPicPr>
+            <a:picLocks noChangeAspect="1"/>
+          </p:cNvPicPr>
+          <p:nvPr/>
+        </p:nvPicPr>
+        <p:blipFill>
+          <a:blip r:embed="rId2">
+            <a:extLst>
+              <a:ext uri="{28A0092B-C50C-407E-A947-70E740481C1C}">
+                <a14:useLocalDpi xmlns:a14="http://schemas.microsoft.com/office/drawing/2010/main" val="0"/>
+              </a:ext>
+            </a:extLst>
+          </a:blip>
+          <a:stretch>
+            <a:fillRect/>
+          </a:stretch>
+        </p:blipFill>
+        <p:spPr>
+          <a:xfrm>
+            <a:off x="-23688" y="2132856"/>
+            <a:ext cx="9144000" cy="3968913"/>
+          </a:xfrm>
+          <a:prstGeom prst="rect">
+            <a:avLst/>
+          </a:prstGeom>
+        </p:spPr>
+      </p:pic>
+    </p:spTree>
+    <p:extLst>
+      <p:ext uri="{BB962C8B-B14F-4D97-AF65-F5344CB8AC3E}">
+        <p14:creationId xmlns:p14="http://schemas.microsoft.com/office/powerpoint/2010/main" val="5914816"/>
+      </p:ext>
+    </p:extLst>
+  </p:cSld>
+  <p:clrMapOvr>
+    <a:masterClrMapping/>
+  </p:clrMapOvr>
+  <p:timing>
+    <p:tnLst>
+      <p:par>
+        <p:cTn id="1" dur="indefinite" restart="never" nodeType="tmRoot"/>
+      </p:par>
+    </p:tnLst>
+  </p:timing>
+</p:sld>
+</file>
+
+<file path=ppt/slides/slide5.xml><?xml version="1.0" encoding="utf-8"?>
+<p:sld xmlns:a="http://schemas.openxmlformats.org/drawingml/2006/main" xmlns:r="http://schemas.openxmlformats.org/officeDocument/2006/relationships" xmlns:p="http://schemas.openxmlformats.org/presentationml/2006/main">
+  <p:cSld>
+    <p:spTree>
+      <p:nvGrpSpPr>
+        <p:cNvPr id="1" name=""/>
+        <p:cNvGrpSpPr/>
+        <p:nvPr/>
+      </p:nvGrpSpPr>
+      <p:grpSpPr>
+        <a:xfrm>
+          <a:off x="0" y="0"/>
+          <a:ext cx="0" cy="0"/>
+          <a:chOff x="0" y="0"/>
+          <a:chExt cx="0" cy="0"/>
+        </a:xfrm>
+      </p:grpSpPr>
+      <p:sp>
+        <p:nvSpPr>
+          <p:cNvPr id="2" name="Nadpis 1"/>
+          <p:cNvSpPr>
+            <a:spLocks noGrp="1"/>
+          </p:cNvSpPr>
+          <p:nvPr>
+            <p:ph type="title"/>
+          </p:nvPr>
+        </p:nvSpPr>
+        <p:spPr/>
+        <p:txBody>
+          <a:bodyPr/>
+          <a:lstStyle/>
+          <a:p>
+            <a:r>
+              <a:rPr lang="cs-CZ" dirty="0" smtClean="0"/>
+              <a:t>co jsme udělali</a:t>
+            </a:r>
+            <a:endParaRPr lang="cs-CZ" dirty="0"/>
+          </a:p>
+        </p:txBody>
+      </p:sp>
+      <p:pic>
+        <p:nvPicPr>
+          <p:cNvPr id="3" name="Picture 2" descr="https://scontent-ams3-1.xx.fbcdn.net/v/t35.0-12/14600596_1076568275792086_1178006626_o.jpg?oh=f800dc4c226b888380cbebec95830c0f&amp;oe=58006AA8"/>
+          <p:cNvPicPr>
+            <a:picLocks noChangeAspect="1" noChangeArrowheads="1"/>
+          </p:cNvPicPr>
+          <p:nvPr/>
+        </p:nvPicPr>
+        <p:blipFill>
+          <a:blip r:embed="rId2">
+            <a:extLst>
+              <a:ext uri="{28A0092B-C50C-407E-A947-70E740481C1C}">
+                <a14:useLocalDpi xmlns:a14="http://schemas.microsoft.com/office/drawing/2010/main" val="0"/>
+              </a:ext>
+            </a:extLst>
+          </a:blip>
+          <a:srcRect/>
+          <a:stretch>
+            <a:fillRect/>
+          </a:stretch>
+        </p:blipFill>
+        <p:spPr bwMode="auto">
+          <a:xfrm>
+            <a:off x="467544" y="1844824"/>
+            <a:ext cx="8194919" cy="4608512"/>
+          </a:xfrm>
+          <a:prstGeom prst="rect">
+            <a:avLst/>
+          </a:prstGeom>
+          <a:noFill/>
+          <a:extLst>
+            <a:ext uri="{909E8E84-426E-40DD-AFC4-6F175D3DCCD1}">
+              <a14:hiddenFill xmlns:a14="http://schemas.microsoft.com/office/drawing/2010/main">
+                <a:solidFill>
+                  <a:srgbClr val="FFFFFF"/>
+                </a:solidFill>
+              </a14:hiddenFill>
+            </a:ext>
+          </a:extLst>
+        </p:spPr>
+      </p:pic>
+    </p:spTree>
+    <p:extLst>
+      <p:ext uri="{BB962C8B-B14F-4D97-AF65-F5344CB8AC3E}">
+        <p14:creationId xmlns:p14="http://schemas.microsoft.com/office/powerpoint/2010/main" val="1937983095"/>
+      </p:ext>
+    </p:extLst>
+  </p:cSld>
+  <p:clrMapOvr>
+    <a:masterClrMapping/>
+  </p:clrMapOvr>
+  <p:timing>
+    <p:tnLst>
+      <p:par>
+        <p:cTn id="1" dur="indefinite" restart="never" nodeType="tmRoot"/>
+      </p:par>
+    </p:tnLst>
+  </p:timing>
+</p:sld>
+</file>
+
+<file path=ppt/slides/slide6.xml><?xml version="1.0" encoding="utf-8"?>
+<p:sld xmlns:a="http://schemas.openxmlformats.org/drawingml/2006/main" xmlns:r="http://schemas.openxmlformats.org/officeDocument/2006/relationships" xmlns:p="http://schemas.openxmlformats.org/presentationml/2006/main">
+  <p:cSld>
+    <p:spTree>
+      <p:nvGrpSpPr>
+        <p:cNvPr id="1" name=""/>
+        <p:cNvGrpSpPr/>
+        <p:nvPr/>
+      </p:nvGrpSpPr>
+      <p:grpSpPr>
+        <a:xfrm>
+          <a:off x="0" y="0"/>
+          <a:ext cx="0" cy="0"/>
+          <a:chOff x="0" y="0"/>
+          <a:chExt cx="0" cy="0"/>
+        </a:xfrm>
+      </p:grpSpPr>
+      <p:sp>
+        <p:nvSpPr>
+          <p:cNvPr id="2" name="Nadpis 1"/>
+          <p:cNvSpPr>
+            <a:spLocks noGrp="1"/>
+          </p:cNvSpPr>
+          <p:nvPr>
+            <p:ph type="title"/>
+          </p:nvPr>
+        </p:nvSpPr>
+        <p:spPr/>
+        <p:txBody>
+          <a:bodyPr/>
+          <a:lstStyle/>
+          <a:p>
+            <a:r>
+              <a:rPr lang="cs-CZ" dirty="0" smtClean="0"/>
+              <a:t>wiki</a:t>
+            </a:r>
+            <a:endParaRPr lang="cs-CZ" dirty="0"/>
+          </a:p>
+        </p:txBody>
+      </p:sp>
+      <p:pic>
+        <p:nvPicPr>
+          <p:cNvPr id="3" name="Obrázek 2"/>
+          <p:cNvPicPr>
+            <a:picLocks noChangeAspect="1"/>
+          </p:cNvPicPr>
+          <p:nvPr/>
+        </p:nvPicPr>
+        <p:blipFill>
+          <a:blip r:embed="rId2">
+            <a:extLst>
+              <a:ext uri="{28A0092B-C50C-407E-A947-70E740481C1C}">
+                <a14:useLocalDpi xmlns:a14="http://schemas.microsoft.com/office/drawing/2010/main" val="0"/>
+              </a:ext>
+            </a:extLst>
+          </a:blip>
+          <a:stretch>
+            <a:fillRect/>
+          </a:stretch>
+        </p:blipFill>
+        <p:spPr>
+          <a:xfrm>
+            <a:off x="35496" y="2276872"/>
+            <a:ext cx="8947968" cy="4295427"/>
+          </a:xfrm>
+          <a:prstGeom prst="rect">
+            <a:avLst/>
+          </a:prstGeom>
+        </p:spPr>
+      </p:pic>
+    </p:spTree>
+    <p:extLst>
+      <p:ext uri="{BB962C8B-B14F-4D97-AF65-F5344CB8AC3E}">
+        <p14:creationId xmlns:p14="http://schemas.microsoft.com/office/powerpoint/2010/main" val="2824168083"/>
+      </p:ext>
+    </p:extLst>
+  </p:cSld>
+  <p:clrMapOvr>
+    <a:masterClrMapping/>
+  </p:clrMapOvr>
+  <p:timing>
+    <p:tnLst>
+      <p:par>
+        <p:cTn id="1" dur="indefinite" restart="never" nodeType="tmRoot"/>
+      </p:par>
+    </p:tnLst>
+  </p:timing>
+</p:sld>
+</file>
+
+<file path=ppt/slides/slide7.xml><?xml version="1.0" encoding="utf-8"?>
+<p:sld xmlns:a="http://schemas.openxmlformats.org/drawingml/2006/main" xmlns:r="http://schemas.openxmlformats.org/officeDocument/2006/relationships" xmlns:p="http://schemas.openxmlformats.org/presentationml/2006/main">
+  <p:cSld>
+    <p:spTree>
+      <p:nvGrpSpPr>
+        <p:cNvPr id="1" name=""/>
+        <p:cNvGrpSpPr/>
+        <p:nvPr/>
+      </p:nvGrpSpPr>
+      <p:grpSpPr>
+        <a:xfrm>
+          <a:off x="0" y="0"/>
+          <a:ext cx="0" cy="0"/>
+          <a:chOff x="0" y="0"/>
+          <a:chExt cx="0" cy="0"/>
+        </a:xfrm>
+      </p:grpSpPr>
+      <p:sp>
+        <p:nvSpPr>
+          <p:cNvPr id="2" name="Nadpis 1"/>
+          <p:cNvSpPr>
+            <a:spLocks noGrp="1"/>
+          </p:cNvSpPr>
+          <p:nvPr>
+            <p:ph type="title"/>
+          </p:nvPr>
+        </p:nvSpPr>
+        <p:spPr>
+          <a:xfrm>
+            <a:off x="457200" y="152718"/>
+            <a:ext cx="6851104" cy="1371600"/>
+          </a:xfrm>
+        </p:spPr>
+        <p:txBody>
+          <a:bodyPr/>
+          <a:lstStyle/>
+          <a:p>
+            <a:r>
+              <a:rPr lang="cs-CZ" dirty="0" smtClean="0"/>
+              <a:t>příprava konzultace</a:t>
+            </a:r>
+            <a:endParaRPr lang="cs-CZ" dirty="0"/>
+          </a:p>
+        </p:txBody>
+      </p:sp>
+      <p:sp>
+        <p:nvSpPr>
+          <p:cNvPr id="3" name="TextovéPole 2"/>
+          <p:cNvSpPr txBox="1"/>
+          <p:nvPr/>
+        </p:nvSpPr>
+        <p:spPr>
+          <a:xfrm>
+            <a:off x="467544" y="1916832"/>
+            <a:ext cx="7776864" cy="3970318"/>
+          </a:xfrm>
+          <a:prstGeom prst="rect">
+            <a:avLst/>
+          </a:prstGeom>
+          <a:noFill/>
+        </p:spPr>
+        <p:txBody>
+          <a:bodyPr wrap="square" rtlCol="0">
+            <a:spAutoFit/>
+          </a:bodyPr>
+          <a:lstStyle/>
+          <a:p>
+            <a:r>
+              <a:rPr lang="cs-CZ" dirty="0">
+                <a:latin typeface="+mj-lt"/>
+              </a:rPr>
+              <a:t>Co Vás vede k domněnce, že se ztrácí peníze, popř. mohl byste to nějak potvrdit (účetnictví, ekonomické podklady)?</a:t>
+            </a:r>
+          </a:p>
+          <a:p>
+            <a:endParaRPr lang="cs-CZ" dirty="0" smtClean="0"/>
+          </a:p>
+          <a:p>
+            <a:endParaRPr lang="cs-CZ" dirty="0" smtClean="0"/>
+          </a:p>
+          <a:p>
+            <a:r>
+              <a:rPr lang="cs-CZ" dirty="0" smtClean="0">
+                <a:latin typeface="+mj-lt"/>
+              </a:rPr>
+              <a:t>Jak </a:t>
+            </a:r>
+            <a:r>
+              <a:rPr lang="cs-CZ" dirty="0">
+                <a:latin typeface="+mj-lt"/>
+              </a:rPr>
+              <a:t>se u Vás v hospodě zpracovávají objednávky? Máte nějaký účetní systém?</a:t>
+            </a:r>
+          </a:p>
+          <a:p>
+            <a:endParaRPr lang="cs-CZ" dirty="0" smtClean="0">
+              <a:latin typeface="+mj-lt"/>
+            </a:endParaRPr>
+          </a:p>
+          <a:p>
+            <a:endParaRPr lang="cs-CZ" dirty="0" smtClean="0">
+              <a:latin typeface="+mj-lt"/>
+            </a:endParaRPr>
+          </a:p>
+          <a:p>
+            <a:r>
+              <a:rPr lang="cs-CZ" dirty="0" smtClean="0">
+                <a:latin typeface="+mj-lt"/>
+              </a:rPr>
+              <a:t>Máte </a:t>
+            </a:r>
+            <a:r>
+              <a:rPr lang="cs-CZ" dirty="0">
+                <a:latin typeface="+mj-lt"/>
+              </a:rPr>
+              <a:t>pouze stálé zaměstnance nebo najímáte i brigádníky?</a:t>
+            </a:r>
+          </a:p>
+          <a:p>
+            <a:endParaRPr lang="cs-CZ" dirty="0" smtClean="0">
+              <a:latin typeface="+mj-lt"/>
+            </a:endParaRPr>
+          </a:p>
+          <a:p>
+            <a:endParaRPr lang="cs-CZ" dirty="0" smtClean="0">
+              <a:latin typeface="+mj-lt"/>
+            </a:endParaRPr>
+          </a:p>
+          <a:p>
+            <a:r>
+              <a:rPr lang="cs-CZ" dirty="0" smtClean="0">
+                <a:latin typeface="+mj-lt"/>
+              </a:rPr>
+              <a:t>Máte </a:t>
+            </a:r>
+            <a:r>
+              <a:rPr lang="cs-CZ" dirty="0">
+                <a:latin typeface="+mj-lt"/>
+              </a:rPr>
+              <a:t>v hospodě nějakou odpovědnou osobu (např. provozního)?</a:t>
+            </a:r>
+          </a:p>
+          <a:p>
+            <a:endParaRPr lang="cs-CZ" dirty="0"/>
+          </a:p>
+        </p:txBody>
+      </p:sp>
+    </p:spTree>
+    <p:extLst>
+      <p:ext uri="{BB962C8B-B14F-4D97-AF65-F5344CB8AC3E}">
+        <p14:creationId xmlns:p14="http://schemas.microsoft.com/office/powerpoint/2010/main" val="2504142035"/>
+      </p:ext>
+    </p:extLst>
+  </p:cSld>
+  <p:clrMapOvr>
+    <a:masterClrMapping/>
+  </p:clrMapOvr>
+  <p:timing>
+    <p:tnLst>
+      <p:par>
+        <p:cTn id="1" dur="indefinite" restart="never" nodeType="tmRoot"/>
+      </p:par>
+    </p:tnLst>
+  </p:timing>
+</p:sld>
+</file>
+
+<file path=ppt/slides/slide8.xml><?xml version="1.0" encoding="utf-8"?>
+<p:sld xmlns:a="http://schemas.openxmlformats.org/drawingml/2006/main" xmlns:r="http://schemas.openxmlformats.org/officeDocument/2006/relationships" xmlns:p="http://schemas.openxmlformats.org/presentationml/2006/main">
+  <p:cSld>
+    <p:spTree>
+      <p:nvGrpSpPr>
+        <p:cNvPr id="1" name=""/>
+        <p:cNvGrpSpPr/>
+        <p:nvPr/>
+      </p:nvGrpSpPr>
+      <p:grpSpPr>
+        <a:xfrm>
+          <a:off x="0" y="0"/>
+          <a:ext cx="0" cy="0"/>
+          <a:chOff x="0" y="0"/>
+          <a:chExt cx="0" cy="0"/>
+        </a:xfrm>
+      </p:grpSpPr>
+      <p:sp>
+        <p:nvSpPr>
+          <p:cNvPr id="2" name="Nadpis 1"/>
+          <p:cNvSpPr>
+            <a:spLocks noGrp="1"/>
+          </p:cNvSpPr>
+          <p:nvPr>
+            <p:ph type="title"/>
+          </p:nvPr>
+        </p:nvSpPr>
+        <p:spPr/>
+        <p:txBody>
+          <a:bodyPr/>
+          <a:lstStyle/>
+          <a:p>
+            <a:r>
+              <a:rPr lang="cs-CZ" dirty="0" smtClean="0"/>
+              <a:t>výkaz práce</a:t>
+            </a:r>
+            <a:endParaRPr lang="cs-CZ" dirty="0"/>
+          </a:p>
+        </p:txBody>
+      </p:sp>
+      <p:sp>
+        <p:nvSpPr>
+          <p:cNvPr id="3" name="TextovéPole 2"/>
+          <p:cNvSpPr txBox="1"/>
+          <p:nvPr/>
+        </p:nvSpPr>
+        <p:spPr>
+          <a:xfrm>
+            <a:off x="467544" y="1827800"/>
+            <a:ext cx="7272808" cy="369332"/>
+          </a:xfrm>
+          <a:prstGeom prst="rect">
+            <a:avLst/>
+          </a:prstGeom>
+          <a:noFill/>
+        </p:spPr>
+        <p:txBody>
+          <a:bodyPr wrap="square" rtlCol="0">
+            <a:spAutoFit/>
+          </a:bodyPr>
+          <a:lstStyle/>
+          <a:p>
+            <a:r>
+              <a:rPr lang="cs-CZ" dirty="0" smtClean="0">
+                <a:solidFill>
+                  <a:schemeClr val="tx1">
+                    <a:lumMod val="85000"/>
+                    <a:lumOff val="15000"/>
+                  </a:schemeClr>
+                </a:solidFill>
+                <a:hlinkClick r:id="rId2"/>
+              </a:rPr>
+              <a:t>Aktuální výkaz práce</a:t>
+            </a:r>
+            <a:endParaRPr lang="cs-CZ" dirty="0">
+              <a:solidFill>
+                <a:schemeClr val="tx1">
+                  <a:lumMod val="85000"/>
+                  <a:lumOff val="15000"/>
+                </a:schemeClr>
+              </a:solidFill>
+            </a:endParaRPr>
+          </a:p>
+        </p:txBody>
+      </p:sp>
+      <p:pic>
+        <p:nvPicPr>
+          <p:cNvPr id="4" name="Obrázek 3"/>
+          <p:cNvPicPr>
+            <a:picLocks noChangeAspect="1"/>
+          </p:cNvPicPr>
+          <p:nvPr/>
+        </p:nvPicPr>
+        <p:blipFill>
+          <a:blip r:embed="rId3">
+            <a:extLst>
+              <a:ext uri="{28A0092B-C50C-407E-A947-70E740481C1C}">
+                <a14:useLocalDpi xmlns:a14="http://schemas.microsoft.com/office/drawing/2010/main" val="0"/>
+              </a:ext>
+            </a:extLst>
+          </a:blip>
+          <a:stretch>
+            <a:fillRect/>
+          </a:stretch>
+        </p:blipFill>
+        <p:spPr>
+          <a:xfrm>
+            <a:off x="0" y="2699708"/>
+            <a:ext cx="8964489" cy="3465596"/>
+          </a:xfrm>
+          <a:prstGeom prst="rect">
+            <a:avLst/>
+          </a:prstGeom>
+        </p:spPr>
+      </p:pic>
+    </p:spTree>
+    <p:extLst>
+      <p:ext uri="{BB962C8B-B14F-4D97-AF65-F5344CB8AC3E}">
+        <p14:creationId xmlns:p14="http://schemas.microsoft.com/office/powerpoint/2010/main" val="3828336446"/>
+      </p:ext>
+    </p:extLst>
+  </p:cSld>
+  <p:clrMapOvr>
+    <a:masterClrMapping/>
+  </p:clrMapOvr>
+  <p:timing>
+    <p:tnLst>
+      <p:par>
+        <p:cTn id="1" dur="indefinite" restart="never" nodeType="tmRoot"/>
+      </p:par>
+    </p:tnLst>
+  </p:timing>
+</p:sld>
+</file>
+
+<file path=ppt/slides/slide9.xml><?xml version="1.0" encoding="utf-8"?>
 <p:sld xmlns:a="http://schemas.openxmlformats.org/drawingml/2006/main" xmlns:r="http://schemas.openxmlformats.org/officeDocument/2006/relationships" xmlns:p="http://schemas.openxmlformats.org/presentationml/2006/main">
   <p:cSld>
     <p:spTree>
@@ -4865,1106 +4901,6 @@
     <p:extLst>
       <p:ext uri="{BB962C8B-B14F-4D97-AF65-F5344CB8AC3E}">
         <p14:creationId xmlns:p14="http://schemas.microsoft.com/office/powerpoint/2010/main" val="1561225116"/>
-      </p:ext>
-    </p:extLst>
-  </p:cSld>
-  <p:clrMapOvr>
-    <a:masterClrMapping/>
-  </p:clrMapOvr>
-  <p:timing>
-    <p:tnLst>
-      <p:par>
-        <p:cTn id="1" dur="indefinite" restart="never" nodeType="tmRoot"/>
-      </p:par>
-    </p:tnLst>
-  </p:timing>
-</p:sld>
-</file>
-
-<file path=ppt/slides/slide13.xml><?xml version="1.0" encoding="utf-8"?>
-<p:sld xmlns:a="http://schemas.openxmlformats.org/drawingml/2006/main" xmlns:r="http://schemas.openxmlformats.org/officeDocument/2006/relationships" xmlns:p="http://schemas.openxmlformats.org/presentationml/2006/main">
-  <p:cSld>
-    <p:spTree>
-      <p:nvGrpSpPr>
-        <p:cNvPr id="1" name=""/>
-        <p:cNvGrpSpPr/>
-        <p:nvPr/>
-      </p:nvGrpSpPr>
-      <p:grpSpPr>
-        <a:xfrm>
-          <a:off x="0" y="0"/>
-          <a:ext cx="0" cy="0"/>
-          <a:chOff x="0" y="0"/>
-          <a:chExt cx="0" cy="0"/>
-        </a:xfrm>
-      </p:grpSpPr>
-    </p:spTree>
-    <p:extLst>
-      <p:ext uri="{BB962C8B-B14F-4D97-AF65-F5344CB8AC3E}">
-        <p14:creationId xmlns:p14="http://schemas.microsoft.com/office/powerpoint/2010/main" val="495207601"/>
-      </p:ext>
-    </p:extLst>
-  </p:cSld>
-  <p:clrMapOvr>
-    <a:masterClrMapping/>
-  </p:clrMapOvr>
-  <p:timing>
-    <p:tnLst>
-      <p:par>
-        <p:cTn id="1" dur="indefinite" restart="never" nodeType="tmRoot"/>
-      </p:par>
-    </p:tnLst>
-  </p:timing>
-</p:sld>
-</file>
-
-<file path=ppt/slides/slide2.xml><?xml version="1.0" encoding="utf-8"?>
-<p:sld xmlns:a="http://schemas.openxmlformats.org/drawingml/2006/main" xmlns:r="http://schemas.openxmlformats.org/officeDocument/2006/relationships" xmlns:p="http://schemas.openxmlformats.org/presentationml/2006/main">
-  <p:cSld>
-    <p:spTree>
-      <p:nvGrpSpPr>
-        <p:cNvPr id="1" name=""/>
-        <p:cNvGrpSpPr/>
-        <p:nvPr/>
-      </p:nvGrpSpPr>
-      <p:grpSpPr>
-        <a:xfrm>
-          <a:off x="0" y="0"/>
-          <a:ext cx="0" cy="0"/>
-          <a:chOff x="0" y="0"/>
-          <a:chExt cx="0" cy="0"/>
-        </a:xfrm>
-      </p:grpSpPr>
-      <p:sp>
-        <p:nvSpPr>
-          <p:cNvPr id="2" name="Nadpis 1"/>
-          <p:cNvSpPr>
-            <a:spLocks noGrp="1"/>
-          </p:cNvSpPr>
-          <p:nvPr>
-            <p:ph type="title"/>
-          </p:nvPr>
-        </p:nvSpPr>
-        <p:spPr>
-          <a:xfrm>
-            <a:off x="457200" y="152718"/>
-            <a:ext cx="6491064" cy="1371600"/>
-          </a:xfrm>
-        </p:spPr>
-        <p:txBody>
-          <a:bodyPr/>
-          <a:lstStyle/>
-          <a:p>
-            <a:r>
-              <a:rPr lang="cs-CZ" dirty="0" smtClean="0"/>
-              <a:t>REPORT OD ZÁKAZNÍKA</a:t>
-            </a:r>
-            <a:endParaRPr lang="cs-CZ" dirty="0"/>
-          </a:p>
-        </p:txBody>
-      </p:sp>
-      <p:pic>
-        <p:nvPicPr>
-          <p:cNvPr id="1026" name="Picture 2" descr="Výsledek obrázku"/>
-          <p:cNvPicPr>
-            <a:picLocks noChangeAspect="1" noChangeArrowheads="1"/>
-          </p:cNvPicPr>
-          <p:nvPr/>
-        </p:nvPicPr>
-        <p:blipFill>
-          <a:blip r:embed="rId2">
-            <a:extLst>
-              <a:ext uri="{28A0092B-C50C-407E-A947-70E740481C1C}">
-                <a14:useLocalDpi xmlns:a14="http://schemas.microsoft.com/office/drawing/2010/main" val="0"/>
-              </a:ext>
-            </a:extLst>
-          </a:blip>
-          <a:srcRect/>
-          <a:stretch>
-            <a:fillRect/>
-          </a:stretch>
-        </p:blipFill>
-        <p:spPr bwMode="auto">
-          <a:xfrm>
-            <a:off x="415361" y="1640182"/>
-            <a:ext cx="7829047" cy="5217818"/>
-          </a:xfrm>
-          <a:prstGeom prst="rect">
-            <a:avLst/>
-          </a:prstGeom>
-          <a:noFill/>
-          <a:extLst>
-            <a:ext uri="{909E8E84-426E-40DD-AFC4-6F175D3DCCD1}">
-              <a14:hiddenFill xmlns:a14="http://schemas.microsoft.com/office/drawing/2010/main">
-                <a:solidFill>
-                  <a:srgbClr val="FFFFFF"/>
-                </a:solidFill>
-              </a14:hiddenFill>
-            </a:ext>
-          </a:extLst>
-        </p:spPr>
-      </p:pic>
-    </p:spTree>
-    <p:extLst>
-      <p:ext uri="{BB962C8B-B14F-4D97-AF65-F5344CB8AC3E}">
-        <p14:creationId xmlns:p14="http://schemas.microsoft.com/office/powerpoint/2010/main" val="2426018872"/>
-      </p:ext>
-    </p:extLst>
-  </p:cSld>
-  <p:clrMapOvr>
-    <a:masterClrMapping/>
-  </p:clrMapOvr>
-  <p:timing>
-    <p:tnLst>
-      <p:par>
-        <p:cTn id="1" dur="indefinite" restart="never" nodeType="tmRoot"/>
-      </p:par>
-    </p:tnLst>
-  </p:timing>
-</p:sld>
-</file>
-
-<file path=ppt/slides/slide3.xml><?xml version="1.0" encoding="utf-8"?>
-<p:sld xmlns:a="http://schemas.openxmlformats.org/drawingml/2006/main" xmlns:r="http://schemas.openxmlformats.org/officeDocument/2006/relationships" xmlns:p="http://schemas.openxmlformats.org/presentationml/2006/main">
-  <p:cSld>
-    <p:spTree>
-      <p:nvGrpSpPr>
-        <p:cNvPr id="1" name=""/>
-        <p:cNvGrpSpPr/>
-        <p:nvPr/>
-      </p:nvGrpSpPr>
-      <p:grpSpPr>
-        <a:xfrm>
-          <a:off x="0" y="0"/>
-          <a:ext cx="0" cy="0"/>
-          <a:chOff x="0" y="0"/>
-          <a:chExt cx="0" cy="0"/>
-        </a:xfrm>
-      </p:grpSpPr>
-      <p:sp>
-        <p:nvSpPr>
-          <p:cNvPr id="2" name="Nadpis 1"/>
-          <p:cNvSpPr>
-            <a:spLocks noGrp="1"/>
-          </p:cNvSpPr>
-          <p:nvPr>
-            <p:ph type="title"/>
-          </p:nvPr>
-        </p:nvSpPr>
-        <p:spPr/>
-        <p:txBody>
-          <a:bodyPr/>
-          <a:lstStyle/>
-          <a:p>
-            <a:r>
-              <a:rPr lang="cs-CZ" dirty="0" smtClean="0"/>
-              <a:t>schůzka 17.10.2016</a:t>
-            </a:r>
-            <a:endParaRPr lang="cs-CZ" dirty="0"/>
-          </a:p>
-        </p:txBody>
-      </p:sp>
-      <p:pic>
-        <p:nvPicPr>
-          <p:cNvPr id="2050" name="Picture 2" descr="https://scontent-amt2-1.xx.fbcdn.net/v/t35.0-12/14787570_1083513908430856_1250566282_o.jpg?oh=0844c8d61d262ec918f1250e25134be0&amp;oe=58099FBE"/>
-          <p:cNvPicPr>
-            <a:picLocks noChangeAspect="1" noChangeArrowheads="1"/>
-          </p:cNvPicPr>
-          <p:nvPr/>
-        </p:nvPicPr>
-        <p:blipFill>
-          <a:blip r:embed="rId2">
-            <a:extLst>
-              <a:ext uri="{28A0092B-C50C-407E-A947-70E740481C1C}">
-                <a14:useLocalDpi xmlns:a14="http://schemas.microsoft.com/office/drawing/2010/main" val="0"/>
-              </a:ext>
-            </a:extLst>
-          </a:blip>
-          <a:srcRect/>
-          <a:stretch>
-            <a:fillRect/>
-          </a:stretch>
-        </p:blipFill>
-        <p:spPr bwMode="auto">
-          <a:xfrm>
-            <a:off x="539552" y="1844824"/>
-            <a:ext cx="8086271" cy="4547412"/>
-          </a:xfrm>
-          <a:prstGeom prst="rect">
-            <a:avLst/>
-          </a:prstGeom>
-          <a:noFill/>
-          <a:extLst>
-            <a:ext uri="{909E8E84-426E-40DD-AFC4-6F175D3DCCD1}">
-              <a14:hiddenFill xmlns:a14="http://schemas.microsoft.com/office/drawing/2010/main">
-                <a:solidFill>
-                  <a:srgbClr val="FFFFFF"/>
-                </a:solidFill>
-              </a14:hiddenFill>
-            </a:ext>
-          </a:extLst>
-        </p:spPr>
-      </p:pic>
-    </p:spTree>
-    <p:extLst>
-      <p:ext uri="{BB962C8B-B14F-4D97-AF65-F5344CB8AC3E}">
-        <p14:creationId xmlns:p14="http://schemas.microsoft.com/office/powerpoint/2010/main" val="2679605548"/>
-      </p:ext>
-    </p:extLst>
-  </p:cSld>
-  <p:clrMapOvr>
-    <a:masterClrMapping/>
-  </p:clrMapOvr>
-  <p:timing>
-    <p:tnLst>
-      <p:par>
-        <p:cTn id="1" dur="indefinite" restart="never" nodeType="tmRoot"/>
-      </p:par>
-    </p:tnLst>
-  </p:timing>
-</p:sld>
-</file>
-
-<file path=ppt/slides/slide4.xml><?xml version="1.0" encoding="utf-8"?>
-<p:sld xmlns:a="http://schemas.openxmlformats.org/drawingml/2006/main" xmlns:r="http://schemas.openxmlformats.org/officeDocument/2006/relationships" xmlns:p="http://schemas.openxmlformats.org/presentationml/2006/main">
-  <p:cSld>
-    <p:spTree>
-      <p:nvGrpSpPr>
-        <p:cNvPr id="1" name=""/>
-        <p:cNvGrpSpPr/>
-        <p:nvPr/>
-      </p:nvGrpSpPr>
-      <p:grpSpPr>
-        <a:xfrm>
-          <a:off x="0" y="0"/>
-          <a:ext cx="0" cy="0"/>
-          <a:chOff x="0" y="0"/>
-          <a:chExt cx="0" cy="0"/>
-        </a:xfrm>
-      </p:grpSpPr>
-      <p:sp>
-        <p:nvSpPr>
-          <p:cNvPr id="2" name="Nadpis 1"/>
-          <p:cNvSpPr>
-            <a:spLocks noGrp="1"/>
-          </p:cNvSpPr>
-          <p:nvPr>
-            <p:ph type="title"/>
-          </p:nvPr>
-        </p:nvSpPr>
-        <p:spPr/>
-        <p:txBody>
-          <a:bodyPr/>
-          <a:lstStyle/>
-          <a:p>
-            <a:r>
-              <a:rPr lang="cs-CZ" dirty="0" smtClean="0"/>
-              <a:t>SCHŮZKA 18.10.2016</a:t>
-            </a:r>
-            <a:endParaRPr lang="cs-CZ" dirty="0"/>
-          </a:p>
-        </p:txBody>
-      </p:sp>
-      <p:pic>
-        <p:nvPicPr>
-          <p:cNvPr id="3074" name="Picture 2" descr="https://scontent-amt2-1.xx.fbcdn.net/v/t35.0-12/14795834_1085039948278252_1573480977_o.jpg?oh=f28d8a292c86b7d2ee70c797aaf9a26e&amp;oe=5809E640"/>
-          <p:cNvPicPr>
-            <a:picLocks noChangeAspect="1" noChangeArrowheads="1"/>
-          </p:cNvPicPr>
-          <p:nvPr/>
-        </p:nvPicPr>
-        <p:blipFill>
-          <a:blip r:embed="rId2">
-            <a:extLst>
-              <a:ext uri="{28A0092B-C50C-407E-A947-70E740481C1C}">
-                <a14:useLocalDpi xmlns:a14="http://schemas.microsoft.com/office/drawing/2010/main" val="0"/>
-              </a:ext>
-            </a:extLst>
-          </a:blip>
-          <a:srcRect/>
-          <a:stretch>
-            <a:fillRect/>
-          </a:stretch>
-        </p:blipFill>
-        <p:spPr bwMode="auto">
-          <a:xfrm>
-            <a:off x="539552" y="1700808"/>
-            <a:ext cx="8104065" cy="4557419"/>
-          </a:xfrm>
-          <a:prstGeom prst="rect">
-            <a:avLst/>
-          </a:prstGeom>
-          <a:noFill/>
-          <a:extLst>
-            <a:ext uri="{909E8E84-426E-40DD-AFC4-6F175D3DCCD1}">
-              <a14:hiddenFill xmlns:a14="http://schemas.microsoft.com/office/drawing/2010/main">
-                <a:solidFill>
-                  <a:srgbClr val="FFFFFF"/>
-                </a:solidFill>
-              </a14:hiddenFill>
-            </a:ext>
-          </a:extLst>
-        </p:spPr>
-      </p:pic>
-    </p:spTree>
-    <p:extLst>
-      <p:ext uri="{BB962C8B-B14F-4D97-AF65-F5344CB8AC3E}">
-        <p14:creationId xmlns:p14="http://schemas.microsoft.com/office/powerpoint/2010/main" val="1744378712"/>
-      </p:ext>
-    </p:extLst>
-  </p:cSld>
-  <p:clrMapOvr>
-    <a:masterClrMapping/>
-  </p:clrMapOvr>
-  <p:timing>
-    <p:tnLst>
-      <p:par>
-        <p:cTn id="1" dur="indefinite" restart="never" nodeType="tmRoot"/>
-      </p:par>
-    </p:tnLst>
-  </p:timing>
-</p:sld>
-</file>
-
-<file path=ppt/slides/slide5.xml><?xml version="1.0" encoding="utf-8"?>
-<p:sld xmlns:a="http://schemas.openxmlformats.org/drawingml/2006/main" xmlns:r="http://schemas.openxmlformats.org/officeDocument/2006/relationships" xmlns:p="http://schemas.openxmlformats.org/presentationml/2006/main">
-  <p:cSld>
-    <p:spTree>
-      <p:nvGrpSpPr>
-        <p:cNvPr id="1" name=""/>
-        <p:cNvGrpSpPr/>
-        <p:nvPr/>
-      </p:nvGrpSpPr>
-      <p:grpSpPr>
-        <a:xfrm>
-          <a:off x="0" y="0"/>
-          <a:ext cx="0" cy="0"/>
-          <a:chOff x="0" y="0"/>
-          <a:chExt cx="0" cy="0"/>
-        </a:xfrm>
-      </p:grpSpPr>
-      <p:sp>
-        <p:nvSpPr>
-          <p:cNvPr id="2" name="Nadpis 1"/>
-          <p:cNvSpPr>
-            <a:spLocks noGrp="1"/>
-          </p:cNvSpPr>
-          <p:nvPr>
-            <p:ph type="title"/>
-          </p:nvPr>
-        </p:nvSpPr>
-        <p:spPr/>
-        <p:txBody>
-          <a:bodyPr/>
-          <a:lstStyle/>
-          <a:p>
-            <a:r>
-              <a:rPr lang="cs-CZ" dirty="0" smtClean="0"/>
-              <a:t>nástroje</a:t>
-            </a:r>
-            <a:endParaRPr lang="cs-CZ" dirty="0"/>
-          </a:p>
-        </p:txBody>
-      </p:sp>
-      <p:pic>
-        <p:nvPicPr>
-          <p:cNvPr id="3" name="Obrázek 2"/>
-          <p:cNvPicPr>
-            <a:picLocks noChangeAspect="1"/>
-          </p:cNvPicPr>
-          <p:nvPr/>
-        </p:nvPicPr>
-        <p:blipFill>
-          <a:blip r:embed="rId2">
-            <a:extLst>
-              <a:ext uri="{28A0092B-C50C-407E-A947-70E740481C1C}">
-                <a14:useLocalDpi xmlns:a14="http://schemas.microsoft.com/office/drawing/2010/main" val="0"/>
-              </a:ext>
-            </a:extLst>
-          </a:blip>
-          <a:stretch>
-            <a:fillRect/>
-          </a:stretch>
-        </p:blipFill>
-        <p:spPr>
-          <a:xfrm>
-            <a:off x="2529565" y="1916832"/>
-            <a:ext cx="3619500" cy="3676650"/>
-          </a:xfrm>
-          <a:prstGeom prst="rect">
-            <a:avLst/>
-          </a:prstGeom>
-        </p:spPr>
-      </p:pic>
-    </p:spTree>
-    <p:extLst>
-      <p:ext uri="{BB962C8B-B14F-4D97-AF65-F5344CB8AC3E}">
-        <p14:creationId xmlns:p14="http://schemas.microsoft.com/office/powerpoint/2010/main" val="1688268970"/>
-      </p:ext>
-    </p:extLst>
-  </p:cSld>
-  <p:clrMapOvr>
-    <a:masterClrMapping/>
-  </p:clrMapOvr>
-  <p:timing>
-    <p:tnLst>
-      <p:par>
-        <p:cTn id="1" dur="indefinite" restart="never" nodeType="tmRoot"/>
-      </p:par>
-    </p:tnLst>
-  </p:timing>
-</p:sld>
-</file>
-
-<file path=ppt/slides/slide6.xml><?xml version="1.0" encoding="utf-8"?>
-<p:sld xmlns:a="http://schemas.openxmlformats.org/drawingml/2006/main" xmlns:r="http://schemas.openxmlformats.org/officeDocument/2006/relationships" xmlns:p="http://schemas.openxmlformats.org/presentationml/2006/main">
-  <p:cSld>
-    <p:spTree>
-      <p:nvGrpSpPr>
-        <p:cNvPr id="1" name=""/>
-        <p:cNvGrpSpPr/>
-        <p:nvPr/>
-      </p:nvGrpSpPr>
-      <p:grpSpPr>
-        <a:xfrm>
-          <a:off x="0" y="0"/>
-          <a:ext cx="0" cy="0"/>
-          <a:chOff x="0" y="0"/>
-          <a:chExt cx="0" cy="0"/>
-        </a:xfrm>
-      </p:grpSpPr>
-      <p:sp>
-        <p:nvSpPr>
-          <p:cNvPr id="2" name="Nadpis 1"/>
-          <p:cNvSpPr>
-            <a:spLocks noGrp="1"/>
-          </p:cNvSpPr>
-          <p:nvPr>
-            <p:ph type="title"/>
-          </p:nvPr>
-        </p:nvSpPr>
-        <p:spPr/>
-        <p:txBody>
-          <a:bodyPr/>
-          <a:lstStyle/>
-          <a:p>
-            <a:r>
-              <a:rPr lang="cs-CZ" dirty="0" smtClean="0"/>
-              <a:t>proč?</a:t>
-            </a:r>
-            <a:endParaRPr lang="cs-CZ" dirty="0"/>
-          </a:p>
-        </p:txBody>
-      </p:sp>
-      <p:sp>
-        <p:nvSpPr>
-          <p:cNvPr id="4" name="Obdélník 3"/>
-          <p:cNvSpPr/>
-          <p:nvPr/>
-        </p:nvSpPr>
-        <p:spPr>
-          <a:xfrm>
-            <a:off x="513341" y="1844824"/>
-            <a:ext cx="7920880" cy="2862322"/>
-          </a:xfrm>
-          <a:prstGeom prst="rect">
-            <a:avLst/>
-          </a:prstGeom>
-        </p:spPr>
-        <p:txBody>
-          <a:bodyPr wrap="square">
-            <a:spAutoFit/>
-          </a:bodyPr>
-          <a:lstStyle/>
-          <a:p>
-            <a:r>
-              <a:rPr lang="cs-CZ" b="1" dirty="0"/>
-              <a:t>Základní </a:t>
-            </a:r>
-            <a:r>
-              <a:rPr lang="cs-CZ" b="1" dirty="0" smtClean="0"/>
-              <a:t>verze</a:t>
-            </a:r>
-          </a:p>
-          <a:p>
-            <a:endParaRPr lang="cs-CZ" dirty="0"/>
-          </a:p>
-          <a:p>
-            <a:pPr marL="742950" lvl="1" indent="-285750">
-              <a:buFont typeface="Arial" panose="020B0604020202020204" pitchFamily="34" charset="0"/>
-              <a:buChar char="•"/>
-            </a:pPr>
-            <a:r>
-              <a:rPr lang="cs-CZ" dirty="0" smtClean="0"/>
-              <a:t>přínos přehledu nad transakcemi</a:t>
-            </a:r>
-          </a:p>
-          <a:p>
-            <a:pPr marL="742950" lvl="1" indent="-285750">
-              <a:buFont typeface="Arial" panose="020B0604020202020204" pitchFamily="34" charset="0"/>
-              <a:buChar char="•"/>
-            </a:pPr>
-            <a:r>
-              <a:rPr lang="cs-CZ" dirty="0" smtClean="0"/>
-              <a:t>zamezení krádežím peněz a zboží</a:t>
-            </a:r>
-          </a:p>
-          <a:p>
-            <a:pPr marL="742950" lvl="1" indent="-285750">
-              <a:buFont typeface="Arial" panose="020B0604020202020204" pitchFamily="34" charset="0"/>
-              <a:buChar char="•"/>
-            </a:pPr>
-            <a:r>
-              <a:rPr lang="cs-CZ" dirty="0" smtClean="0"/>
-              <a:t>zvýšení bezpečnosti personálu i hostů</a:t>
-            </a:r>
-            <a:endParaRPr lang="cs-CZ" dirty="0"/>
-          </a:p>
-          <a:p>
-            <a:endParaRPr lang="cs-CZ" b="1" dirty="0" smtClean="0"/>
-          </a:p>
-          <a:p>
-            <a:r>
-              <a:rPr lang="cs-CZ" b="1" dirty="0" smtClean="0"/>
-              <a:t>Nadstavba</a:t>
-            </a:r>
-          </a:p>
-          <a:p>
-            <a:endParaRPr lang="cs-CZ" dirty="0"/>
-          </a:p>
-          <a:p>
-            <a:pPr marL="742950" lvl="1" indent="-285750">
-              <a:buFont typeface="Arial" panose="020B0604020202020204" pitchFamily="34" charset="0"/>
-              <a:buChar char="•"/>
-            </a:pPr>
-            <a:r>
-              <a:rPr lang="cs-CZ" dirty="0" smtClean="0"/>
-              <a:t>zvýšení zisků</a:t>
-            </a:r>
-            <a:endParaRPr lang="cs-CZ" dirty="0"/>
-          </a:p>
-          <a:p>
-            <a:pPr marL="742950" lvl="1" indent="-285750">
-              <a:buFont typeface="Arial" panose="020B0604020202020204" pitchFamily="34" charset="0"/>
-              <a:buChar char="•"/>
-            </a:pPr>
-            <a:r>
-              <a:rPr lang="cs-CZ" dirty="0"/>
-              <a:t>zvýšení </a:t>
-            </a:r>
-            <a:r>
-              <a:rPr lang="cs-CZ" dirty="0" smtClean="0"/>
-              <a:t>povědomosti o restauraci</a:t>
-            </a:r>
-            <a:endParaRPr lang="cs-CZ" dirty="0"/>
-          </a:p>
-        </p:txBody>
-      </p:sp>
-    </p:spTree>
-    <p:extLst>
-      <p:ext uri="{BB962C8B-B14F-4D97-AF65-F5344CB8AC3E}">
-        <p14:creationId xmlns:p14="http://schemas.microsoft.com/office/powerpoint/2010/main" val="3732063583"/>
-      </p:ext>
-    </p:extLst>
-  </p:cSld>
-  <p:clrMapOvr>
-    <a:masterClrMapping/>
-  </p:clrMapOvr>
-  <p:timing>
-    <p:tnLst>
-      <p:par>
-        <p:cTn id="1" dur="indefinite" restart="never" nodeType="tmRoot"/>
-      </p:par>
-    </p:tnLst>
-  </p:timing>
-</p:sld>
-</file>
-
-<file path=ppt/slides/slide7.xml><?xml version="1.0" encoding="utf-8"?>
-<p:sld xmlns:a="http://schemas.openxmlformats.org/drawingml/2006/main" xmlns:r="http://schemas.openxmlformats.org/officeDocument/2006/relationships" xmlns:p="http://schemas.openxmlformats.org/presentationml/2006/main">
-  <p:cSld>
-    <p:spTree>
-      <p:nvGrpSpPr>
-        <p:cNvPr id="1" name=""/>
-        <p:cNvGrpSpPr/>
-        <p:nvPr/>
-      </p:nvGrpSpPr>
-      <p:grpSpPr>
-        <a:xfrm>
-          <a:off x="0" y="0"/>
-          <a:ext cx="0" cy="0"/>
-          <a:chOff x="0" y="0"/>
-          <a:chExt cx="0" cy="0"/>
-        </a:xfrm>
-      </p:grpSpPr>
-      <p:sp>
-        <p:nvSpPr>
-          <p:cNvPr id="2" name="Nadpis 1"/>
-          <p:cNvSpPr>
-            <a:spLocks noGrp="1"/>
-          </p:cNvSpPr>
-          <p:nvPr>
-            <p:ph type="title"/>
-          </p:nvPr>
-        </p:nvSpPr>
-        <p:spPr/>
-        <p:txBody>
-          <a:bodyPr/>
-          <a:lstStyle/>
-          <a:p>
-            <a:r>
-              <a:rPr lang="cs-CZ" dirty="0" smtClean="0"/>
-              <a:t>KDO?</a:t>
-            </a:r>
-            <a:endParaRPr lang="cs-CZ" dirty="0"/>
-          </a:p>
-        </p:txBody>
-      </p:sp>
-      <p:sp>
-        <p:nvSpPr>
-          <p:cNvPr id="3" name="Obdélník 2"/>
-          <p:cNvSpPr/>
-          <p:nvPr/>
-        </p:nvSpPr>
-        <p:spPr>
-          <a:xfrm>
-            <a:off x="467544" y="1844824"/>
-            <a:ext cx="7992887" cy="2031325"/>
-          </a:xfrm>
-          <a:prstGeom prst="rect">
-            <a:avLst/>
-          </a:prstGeom>
-        </p:spPr>
-        <p:txBody>
-          <a:bodyPr wrap="square">
-            <a:spAutoFit/>
-          </a:bodyPr>
-          <a:lstStyle/>
-          <a:p>
-            <a:r>
-              <a:rPr lang="cs-CZ" b="1" dirty="0"/>
-              <a:t>Jakub </a:t>
-            </a:r>
-            <a:r>
-              <a:rPr lang="cs-CZ" b="1" dirty="0" smtClean="0"/>
-              <a:t>Hruška </a:t>
-            </a:r>
-            <a:r>
-              <a:rPr lang="cs-CZ" dirty="0" smtClean="0"/>
-              <a:t>- </a:t>
-            </a:r>
-            <a:r>
-              <a:rPr lang="cs-CZ" dirty="0"/>
-              <a:t>vedení týmu, dodržování </a:t>
-            </a:r>
-            <a:r>
-              <a:rPr lang="cs-CZ" dirty="0" smtClean="0"/>
-              <a:t>termínu</a:t>
-            </a:r>
-          </a:p>
-          <a:p>
-            <a:endParaRPr lang="cs-CZ" dirty="0"/>
-          </a:p>
-          <a:p>
-            <a:r>
-              <a:rPr lang="cs-CZ" b="1" dirty="0" smtClean="0"/>
-              <a:t>Michal Koreš </a:t>
-            </a:r>
-            <a:r>
-              <a:rPr lang="cs-CZ" dirty="0" smtClean="0"/>
-              <a:t>- </a:t>
-            </a:r>
-            <a:r>
-              <a:rPr lang="cs-CZ" dirty="0"/>
-              <a:t>úpravy a aktualizace wiki, marketingový </a:t>
-            </a:r>
-            <a:r>
-              <a:rPr lang="cs-CZ" dirty="0" smtClean="0"/>
-              <a:t>specialista</a:t>
-            </a:r>
-          </a:p>
-          <a:p>
-            <a:endParaRPr lang="cs-CZ" b="1" dirty="0"/>
-          </a:p>
-          <a:p>
-            <a:r>
-              <a:rPr lang="cs-CZ" b="1" dirty="0" smtClean="0"/>
-              <a:t>Jakub Kučera</a:t>
-            </a:r>
-            <a:r>
-              <a:rPr lang="cs-CZ" dirty="0" smtClean="0"/>
-              <a:t> - tvorba </a:t>
-            </a:r>
-            <a:r>
-              <a:rPr lang="cs-CZ" dirty="0"/>
-              <a:t>zápisů a prezentací, správce </a:t>
-            </a:r>
-            <a:r>
-              <a:rPr lang="cs-CZ" dirty="0" smtClean="0"/>
-              <a:t>systému </a:t>
-            </a:r>
-            <a:r>
-              <a:rPr lang="cs-CZ" dirty="0" err="1" smtClean="0"/>
-              <a:t>Trello</a:t>
-            </a:r>
-            <a:endParaRPr lang="cs-CZ" dirty="0" smtClean="0"/>
-          </a:p>
-          <a:p>
-            <a:endParaRPr lang="cs-CZ" b="1" dirty="0"/>
-          </a:p>
-          <a:p>
-            <a:r>
-              <a:rPr lang="cs-CZ" b="1" dirty="0"/>
-              <a:t>Konstantin </a:t>
-            </a:r>
-            <a:r>
-              <a:rPr lang="cs-CZ" b="1" dirty="0" err="1" smtClean="0"/>
-              <a:t>Kožokar</a:t>
-            </a:r>
-            <a:r>
-              <a:rPr lang="cs-CZ" dirty="0"/>
-              <a:t> </a:t>
-            </a:r>
-            <a:r>
-              <a:rPr lang="cs-CZ" dirty="0" smtClean="0"/>
-              <a:t>- </a:t>
-            </a:r>
-            <a:r>
-              <a:rPr lang="cs-CZ" dirty="0"/>
-              <a:t>prezentace výstupů, analýza cen</a:t>
-            </a:r>
-            <a:endParaRPr lang="cs-CZ" b="1" dirty="0"/>
-          </a:p>
-        </p:txBody>
-      </p:sp>
-    </p:spTree>
-    <p:extLst>
-      <p:ext uri="{BB962C8B-B14F-4D97-AF65-F5344CB8AC3E}">
-        <p14:creationId xmlns:p14="http://schemas.microsoft.com/office/powerpoint/2010/main" val="3261394939"/>
-      </p:ext>
-    </p:extLst>
-  </p:cSld>
-  <p:clrMapOvr>
-    <a:masterClrMapping/>
-  </p:clrMapOvr>
-  <p:timing>
-    <p:tnLst>
-      <p:par>
-        <p:cTn id="1" dur="indefinite" restart="never" nodeType="tmRoot"/>
-      </p:par>
-    </p:tnLst>
-  </p:timing>
-</p:sld>
-</file>
-
-<file path=ppt/slides/slide8.xml><?xml version="1.0" encoding="utf-8"?>
-<p:sld xmlns:a="http://schemas.openxmlformats.org/drawingml/2006/main" xmlns:r="http://schemas.openxmlformats.org/officeDocument/2006/relationships" xmlns:p="http://schemas.openxmlformats.org/presentationml/2006/main">
-  <p:cSld>
-    <p:spTree>
-      <p:nvGrpSpPr>
-        <p:cNvPr id="1" name=""/>
-        <p:cNvGrpSpPr/>
-        <p:nvPr/>
-      </p:nvGrpSpPr>
-      <p:grpSpPr>
-        <a:xfrm>
-          <a:off x="0" y="0"/>
-          <a:ext cx="0" cy="0"/>
-          <a:chOff x="0" y="0"/>
-          <a:chExt cx="0" cy="0"/>
-        </a:xfrm>
-      </p:grpSpPr>
-      <p:sp>
-        <p:nvSpPr>
-          <p:cNvPr id="2" name="Nadpis 1"/>
-          <p:cNvSpPr>
-            <a:spLocks noGrp="1"/>
-          </p:cNvSpPr>
-          <p:nvPr>
-            <p:ph type="title"/>
-          </p:nvPr>
-        </p:nvSpPr>
-        <p:spPr/>
-        <p:txBody>
-          <a:bodyPr/>
-          <a:lstStyle/>
-          <a:p>
-            <a:r>
-              <a:rPr lang="cs-CZ" dirty="0" smtClean="0"/>
-              <a:t>Kritéria úspěchu</a:t>
-            </a:r>
-            <a:endParaRPr lang="cs-CZ" dirty="0"/>
-          </a:p>
-        </p:txBody>
-      </p:sp>
-      <p:sp>
-        <p:nvSpPr>
-          <p:cNvPr id="3" name="Obdélník 2"/>
-          <p:cNvSpPr/>
-          <p:nvPr/>
-        </p:nvSpPr>
-        <p:spPr>
-          <a:xfrm>
-            <a:off x="513341" y="1844824"/>
-            <a:ext cx="7920880" cy="2308324"/>
-          </a:xfrm>
-          <a:prstGeom prst="rect">
-            <a:avLst/>
-          </a:prstGeom>
-        </p:spPr>
-        <p:txBody>
-          <a:bodyPr wrap="square">
-            <a:spAutoFit/>
-          </a:bodyPr>
-          <a:lstStyle/>
-          <a:p>
-            <a:r>
-              <a:rPr lang="cs-CZ" b="1" dirty="0"/>
-              <a:t>Základní </a:t>
-            </a:r>
-            <a:r>
-              <a:rPr lang="cs-CZ" b="1" dirty="0" smtClean="0"/>
-              <a:t>verze</a:t>
-            </a:r>
-          </a:p>
-          <a:p>
-            <a:endParaRPr lang="cs-CZ" dirty="0"/>
-          </a:p>
-          <a:p>
-            <a:pPr marL="742950" lvl="1" indent="-285750">
-              <a:buFont typeface="Arial" panose="020B0604020202020204" pitchFamily="34" charset="0"/>
-              <a:buChar char="•"/>
-            </a:pPr>
-            <a:r>
-              <a:rPr lang="cs-CZ" dirty="0" smtClean="0"/>
-              <a:t>zredukování peněžní </a:t>
-            </a:r>
-            <a:r>
-              <a:rPr lang="cs-CZ" dirty="0"/>
-              <a:t>a materiální ztráty o 90</a:t>
-            </a:r>
-            <a:r>
-              <a:rPr lang="cs-CZ" dirty="0" smtClean="0"/>
-              <a:t>%</a:t>
-            </a:r>
-            <a:endParaRPr lang="cs-CZ" dirty="0"/>
-          </a:p>
-          <a:p>
-            <a:endParaRPr lang="cs-CZ" b="1" dirty="0" smtClean="0"/>
-          </a:p>
-          <a:p>
-            <a:r>
-              <a:rPr lang="cs-CZ" b="1" dirty="0" smtClean="0"/>
-              <a:t>Nadstavba</a:t>
-            </a:r>
-          </a:p>
-          <a:p>
-            <a:endParaRPr lang="cs-CZ" dirty="0"/>
-          </a:p>
-          <a:p>
-            <a:pPr marL="742950" lvl="1" indent="-285750">
-              <a:buFont typeface="Arial" panose="020B0604020202020204" pitchFamily="34" charset="0"/>
-              <a:buChar char="•"/>
-            </a:pPr>
-            <a:r>
-              <a:rPr lang="cs-CZ" dirty="0" smtClean="0"/>
-              <a:t>zvýšení obsazenosti </a:t>
-            </a:r>
-            <a:r>
-              <a:rPr lang="cs-CZ" dirty="0"/>
-              <a:t>restaurace na 75</a:t>
-            </a:r>
-            <a:r>
-              <a:rPr lang="cs-CZ" dirty="0" smtClean="0"/>
-              <a:t>%</a:t>
-            </a:r>
-            <a:endParaRPr lang="cs-CZ" dirty="0"/>
-          </a:p>
-          <a:p>
-            <a:pPr marL="742950" lvl="1" indent="-285750">
-              <a:buFont typeface="Arial" panose="020B0604020202020204" pitchFamily="34" charset="0"/>
-              <a:buChar char="•"/>
-            </a:pPr>
-            <a:r>
-              <a:rPr lang="cs-CZ" dirty="0"/>
-              <a:t>zvýšení návštěvnosti webových stránek na </a:t>
-            </a:r>
-            <a:r>
-              <a:rPr lang="cs-CZ" dirty="0" smtClean="0"/>
-              <a:t>čtyřnásobek</a:t>
-            </a:r>
-            <a:endParaRPr lang="cs-CZ" dirty="0"/>
-          </a:p>
-        </p:txBody>
-      </p:sp>
-    </p:spTree>
-    <p:extLst>
-      <p:ext uri="{BB962C8B-B14F-4D97-AF65-F5344CB8AC3E}">
-        <p14:creationId xmlns:p14="http://schemas.microsoft.com/office/powerpoint/2010/main" val="1837773488"/>
-      </p:ext>
-    </p:extLst>
-  </p:cSld>
-  <p:clrMapOvr>
-    <a:masterClrMapping/>
-  </p:clrMapOvr>
-  <p:timing>
-    <p:tnLst>
-      <p:par>
-        <p:cTn id="1" dur="indefinite" restart="never" nodeType="tmRoot"/>
-      </p:par>
-    </p:tnLst>
-  </p:timing>
-</p:sld>
-</file>
-
-<file path=ppt/slides/slide9.xml><?xml version="1.0" encoding="utf-8"?>
-<p:sld xmlns:a="http://schemas.openxmlformats.org/drawingml/2006/main" xmlns:r="http://schemas.openxmlformats.org/officeDocument/2006/relationships" xmlns:p="http://schemas.openxmlformats.org/presentationml/2006/main">
-  <p:cSld>
-    <p:spTree>
-      <p:nvGrpSpPr>
-        <p:cNvPr id="1" name=""/>
-        <p:cNvGrpSpPr/>
-        <p:nvPr/>
-      </p:nvGrpSpPr>
-      <p:grpSpPr>
-        <a:xfrm>
-          <a:off x="0" y="0"/>
-          <a:ext cx="0" cy="0"/>
-          <a:chOff x="0" y="0"/>
-          <a:chExt cx="0" cy="0"/>
-        </a:xfrm>
-      </p:grpSpPr>
-      <p:sp>
-        <p:nvSpPr>
-          <p:cNvPr id="2" name="Nadpis 1"/>
-          <p:cNvSpPr>
-            <a:spLocks noGrp="1"/>
-          </p:cNvSpPr>
-          <p:nvPr>
-            <p:ph type="title"/>
-          </p:nvPr>
-        </p:nvSpPr>
-        <p:spPr/>
-        <p:txBody>
-          <a:bodyPr/>
-          <a:lstStyle/>
-          <a:p>
-            <a:r>
-              <a:rPr lang="cs-CZ" dirty="0" smtClean="0"/>
-              <a:t>Varianty řešení</a:t>
-            </a:r>
-            <a:endParaRPr lang="cs-CZ" dirty="0"/>
-          </a:p>
-        </p:txBody>
-      </p:sp>
-      <p:sp>
-        <p:nvSpPr>
-          <p:cNvPr id="4" name="Obdélník 3"/>
-          <p:cNvSpPr/>
-          <p:nvPr/>
-        </p:nvSpPr>
-        <p:spPr>
-          <a:xfrm>
-            <a:off x="513341" y="1844824"/>
-            <a:ext cx="7920880" cy="2862322"/>
-          </a:xfrm>
-          <a:prstGeom prst="rect">
-            <a:avLst/>
-          </a:prstGeom>
-        </p:spPr>
-        <p:txBody>
-          <a:bodyPr wrap="square">
-            <a:spAutoFit/>
-          </a:bodyPr>
-          <a:lstStyle/>
-          <a:p>
-            <a:r>
-              <a:rPr lang="cs-CZ" b="1" dirty="0"/>
-              <a:t>Základní </a:t>
-            </a:r>
-            <a:r>
-              <a:rPr lang="cs-CZ" b="1" dirty="0" smtClean="0"/>
-              <a:t>verze</a:t>
-            </a:r>
-          </a:p>
-          <a:p>
-            <a:endParaRPr lang="cs-CZ" dirty="0"/>
-          </a:p>
-          <a:p>
-            <a:pPr marL="742950" lvl="1" indent="-285750">
-              <a:buFont typeface="Arial" panose="020B0604020202020204" pitchFamily="34" charset="0"/>
-              <a:buChar char="•"/>
-            </a:pPr>
-            <a:r>
-              <a:rPr lang="cs-CZ" dirty="0" smtClean="0"/>
-              <a:t>instalace pokladního a skladového systému</a:t>
-            </a:r>
-          </a:p>
-          <a:p>
-            <a:pPr marL="742950" lvl="1" indent="-285750">
-              <a:buFont typeface="Arial" panose="020B0604020202020204" pitchFamily="34" charset="0"/>
-              <a:buChar char="•"/>
-            </a:pPr>
-            <a:r>
-              <a:rPr lang="cs-CZ" dirty="0" smtClean="0"/>
-              <a:t>instalace kamerového systému</a:t>
-            </a:r>
-            <a:endParaRPr lang="cs-CZ" dirty="0"/>
-          </a:p>
-          <a:p>
-            <a:endParaRPr lang="cs-CZ" b="1" dirty="0" smtClean="0"/>
-          </a:p>
-          <a:p>
-            <a:r>
-              <a:rPr lang="cs-CZ" b="1" dirty="0" smtClean="0"/>
-              <a:t>Nadstavba</a:t>
-            </a:r>
-          </a:p>
-          <a:p>
-            <a:endParaRPr lang="cs-CZ" dirty="0"/>
-          </a:p>
-          <a:p>
-            <a:pPr marL="742950" lvl="1" indent="-285750">
-              <a:buFont typeface="Arial" panose="020B0604020202020204" pitchFamily="34" charset="0"/>
-              <a:buChar char="•"/>
-            </a:pPr>
-            <a:r>
-              <a:rPr lang="cs-CZ" dirty="0" smtClean="0"/>
-              <a:t>obchodní a marketingový plán</a:t>
-            </a:r>
-            <a:endParaRPr lang="cs-CZ" dirty="0"/>
-          </a:p>
-          <a:p>
-            <a:pPr marL="742950" lvl="1" indent="-285750">
-              <a:buFont typeface="Arial" panose="020B0604020202020204" pitchFamily="34" charset="0"/>
-              <a:buChar char="•"/>
-            </a:pPr>
-            <a:r>
-              <a:rPr lang="cs-CZ" dirty="0" smtClean="0"/>
-              <a:t>vyhotovení webových stránek</a:t>
-            </a:r>
-          </a:p>
-          <a:p>
-            <a:pPr marL="742950" lvl="1" indent="-285750">
-              <a:buFont typeface="Arial" panose="020B0604020202020204" pitchFamily="34" charset="0"/>
-              <a:buChar char="•"/>
-            </a:pPr>
-            <a:r>
-              <a:rPr lang="cs-CZ" dirty="0" smtClean="0"/>
-              <a:t>vyhotovení stránek na </a:t>
-            </a:r>
-            <a:r>
-              <a:rPr lang="cs-CZ" dirty="0" err="1" smtClean="0"/>
-              <a:t>Facebooku</a:t>
-            </a:r>
-            <a:endParaRPr lang="cs-CZ" dirty="0"/>
-          </a:p>
-        </p:txBody>
-      </p:sp>
-    </p:spTree>
-    <p:extLst>
-      <p:ext uri="{BB962C8B-B14F-4D97-AF65-F5344CB8AC3E}">
-        <p14:creationId xmlns:p14="http://schemas.microsoft.com/office/powerpoint/2010/main" val="1730958091"/>
       </p:ext>
     </p:extLst>
   </p:cSld>
@@ -6232,289 +5168,4 @@
   <a:objectDefaults/>
   <a:extraClrSchemeLst/>
 </a:theme>
-</file>
-
-<file path=ppt/theme/theme2.xml><?xml version="1.0" encoding="utf-8"?>
-<a:theme xmlns:a="http://schemas.openxmlformats.org/drawingml/2006/main" name="Motiv systému Office">
-  <a:themeElements>
-    <a:clrScheme name="Kancelář">
-      <a:dk1>
-        <a:sysClr val="windowText" lastClr="000000"/>
-      </a:dk1>
-      <a:lt1>
-        <a:sysClr val="window" lastClr="FFFFFF"/>
-      </a:lt1>
-      <a:dk2>
-        <a:srgbClr val="1F497D"/>
-      </a:dk2>
-      <a:lt2>
-        <a:srgbClr val="EEECE1"/>
-      </a:lt2>
-      <a:accent1>
-        <a:srgbClr val="4F81BD"/>
-      </a:accent1>
-      <a:accent2>
-        <a:srgbClr val="C0504D"/>
-      </a:accent2>
-      <a:accent3>
-        <a:srgbClr val="9BBB59"/>
-      </a:accent3>
-      <a:accent4>
-        <a:srgbClr val="8064A2"/>
-      </a:accent4>
-      <a:accent5>
-        <a:srgbClr val="4BACC6"/>
-      </a:accent5>
-      <a:accent6>
-        <a:srgbClr val="F79646"/>
-      </a:accent6>
-      <a:hlink>
-        <a:srgbClr val="0000FF"/>
-      </a:hlink>
-      <a:folHlink>
-        <a:srgbClr val="800080"/>
-      </a:folHlink>
-    </a:clrScheme>
-    <a:fontScheme name="Kancelář">
-      <a:majorFont>
-        <a:latin typeface="Calibri"/>
-        <a:ea typeface=""/>
-        <a:cs typeface=""/>
-        <a:font script="Jpan" typeface="ＭＳ Ｐゴシック"/>
-        <a:font script="Hang" typeface="맑은 고딕"/>
-        <a:font script="Hans" typeface="宋体"/>
-        <a:font script="Hant" typeface="新細明體"/>
-        <a:font script="Arab" typeface="Times New Roman"/>
-        <a:font script="Hebr" typeface="Times New Roman"/>
-        <a:font script="Thai" typeface="Angsana New"/>
-        <a:font script="Ethi" typeface="Nyala"/>
-        <a:font script="Beng" typeface="Vrinda"/>
-        <a:font script="Gujr" typeface="Shruti"/>
-        <a:font script="Khmr" typeface="MoolBoran"/>
-        <a:font script="Knda" typeface="Tunga"/>
-        <a:font script="Guru" typeface="Raavi"/>
-        <a:font script="Cans" typeface="Euphemia"/>
-        <a:font script="Cher" typeface="Plantagenet Cherokee"/>
-        <a:font script="Yiii" typeface="Microsoft Yi Baiti"/>
-        <a:font script="Tibt" typeface="Microsoft Himalaya"/>
-        <a:font script="Thaa" typeface="MV Boli"/>
-        <a:font script="Deva" typeface="Mangal"/>
-        <a:font script="Telu" typeface="Gautami"/>
-        <a:font script="Taml" typeface="Latha"/>
-        <a:font script="Syrc" typeface="Estrangelo Edessa"/>
-        <a:font script="Orya" typeface="Kalinga"/>
-        <a:font script="Mlym" typeface="Kartika"/>
-        <a:font script="Laoo" typeface="DokChampa"/>
-        <a:font script="Sinh" typeface="Iskoola Pota"/>
-        <a:font script="Mong" typeface="Mongolian Baiti"/>
-        <a:font script="Viet" typeface="Times New Roman"/>
-        <a:font script="Uigh" typeface="Microsoft Uighur"/>
-        <a:font script="Geor" typeface="Sylfaen"/>
-      </a:majorFont>
-      <a:minorFont>
-        <a:latin typeface="Calibri"/>
-        <a:ea typeface=""/>
-        <a:cs typeface=""/>
-        <a:font script="Jpan" typeface="ＭＳ Ｐゴシック"/>
-        <a:font script="Hang" typeface="맑은 고딕"/>
-        <a:font script="Hans" typeface="宋体"/>
-        <a:font script="Hant" typeface="新細明體"/>
-        <a:font script="Arab" typeface="Arial"/>
-        <a:font script="Hebr" typeface="Arial"/>
-        <a:font script="Thai" typeface="Cordia New"/>
-        <a:font script="Ethi" typeface="Nyala"/>
-        <a:font script="Beng" typeface="Vrinda"/>
-        <a:font script="Gujr" typeface="Shruti"/>
-        <a:font script="Khmr" typeface="DaunPenh"/>
-        <a:font script="Knda" typeface="Tunga"/>
-        <a:font script="Guru" typeface="Raavi"/>
-        <a:font script="Cans" typeface="Euphemia"/>
-        <a:font script="Cher" typeface="Plantagenet Cherokee"/>
-        <a:font script="Yiii" typeface="Microsoft Yi Baiti"/>
-        <a:font script="Tibt" typeface="Microsoft Himalaya"/>
-        <a:font script="Thaa" typeface="MV Boli"/>
-        <a:font script="Deva" typeface="Mangal"/>
-        <a:font script="Telu" typeface="Gautami"/>
-        <a:font script="Taml" typeface="Latha"/>
-        <a:font script="Syrc" typeface="Estrangelo Edessa"/>
-        <a:font script="Orya" typeface="Kalinga"/>
-        <a:font script="Mlym" typeface="Kartika"/>
-        <a:font script="Laoo" typeface="DokChampa"/>
-        <a:font script="Sinh" typeface="Iskoola Pota"/>
-        <a:font script="Mong" typeface="Mongolian Baiti"/>
-        <a:font script="Viet" typeface="Arial"/>
-        <a:font script="Uigh" typeface="Microsoft Uighur"/>
-        <a:font script="Geor" typeface="Sylfaen"/>
-      </a:minorFont>
-    </a:fontScheme>
-    <a:fmtScheme name="Kancelář">
-      <a:fillStyleLst>
-        <a:solidFill>
-          <a:schemeClr val="phClr"/>
-        </a:solidFill>
-        <a:gradFill rotWithShape="1">
-          <a:gsLst>
-            <a:gs pos="0">
-              <a:schemeClr val="phClr">
-                <a:tint val="50000"/>
-                <a:satMod val="300000"/>
-              </a:schemeClr>
-            </a:gs>
-            <a:gs pos="35000">
-              <a:schemeClr val="phClr">
-                <a:tint val="37000"/>
-                <a:satMod val="300000"/>
-              </a:schemeClr>
-            </a:gs>
-            <a:gs pos="100000">
-              <a:schemeClr val="phClr">
-                <a:tint val="15000"/>
-                <a:satMod val="350000"/>
-              </a:schemeClr>
-            </a:gs>
-          </a:gsLst>
-          <a:lin ang="16200000" scaled="1"/>
-        </a:gradFill>
-        <a:gradFill rotWithShape="1">
-          <a:gsLst>
-            <a:gs pos="0">
-              <a:schemeClr val="phClr">
-                <a:shade val="51000"/>
-                <a:satMod val="130000"/>
-              </a:schemeClr>
-            </a:gs>
-            <a:gs pos="80000">
-              <a:schemeClr val="phClr">
-                <a:shade val="93000"/>
-                <a:satMod val="130000"/>
-              </a:schemeClr>
-            </a:gs>
-            <a:gs pos="100000">
-              <a:schemeClr val="phClr">
-                <a:shade val="94000"/>
-                <a:satMod val="135000"/>
-              </a:schemeClr>
-            </a:gs>
-          </a:gsLst>
-          <a:lin ang="16200000" scaled="0"/>
-        </a:gradFill>
-      </a:fillStyleLst>
-      <a:lnStyleLst>
-        <a:ln w="9525" cap="flat" cmpd="sng" algn="ctr">
-          <a:solidFill>
-            <a:schemeClr val="phClr">
-              <a:shade val="95000"/>
-              <a:satMod val="105000"/>
-            </a:schemeClr>
-          </a:solidFill>
-          <a:prstDash val="solid"/>
-        </a:ln>
-        <a:ln w="25400" cap="flat" cmpd="sng" algn="ctr">
-          <a:solidFill>
-            <a:schemeClr val="phClr"/>
-          </a:solidFill>
-          <a:prstDash val="solid"/>
-        </a:ln>
-        <a:ln w="38100" cap="flat" cmpd="sng" algn="ctr">
-          <a:solidFill>
-            <a:schemeClr val="phClr"/>
-          </a:solidFill>
-          <a:prstDash val="solid"/>
-        </a:ln>
-      </a:lnStyleLst>
-      <a:effectStyleLst>
-        <a:effectStyle>
-          <a:effectLst>
-            <a:outerShdw blurRad="40000" dist="20000" dir="5400000" rotWithShape="0">
-              <a:srgbClr val="000000">
-                <a:alpha val="38000"/>
-              </a:srgbClr>
-            </a:outerShdw>
-          </a:effectLst>
-        </a:effectStyle>
-        <a:effectStyle>
-          <a:effectLst>
-            <a:outerShdw blurRad="40000" dist="23000" dir="5400000" rotWithShape="0">
-              <a:srgbClr val="000000">
-                <a:alpha val="35000"/>
-              </a:srgbClr>
-            </a:outerShdw>
-          </a:effectLst>
-        </a:effectStyle>
-        <a:effectStyle>
-          <a:effectLst>
-            <a:outerShdw blurRad="40000" dist="23000" dir="5400000" rotWithShape="0">
-              <a:srgbClr val="000000">
-                <a:alpha val="35000"/>
-              </a:srgbClr>
-            </a:outerShdw>
-          </a:effectLst>
-          <a:scene3d>
-            <a:camera prst="orthographicFront">
-              <a:rot lat="0" lon="0" rev="0"/>
-            </a:camera>
-            <a:lightRig rig="threePt" dir="t">
-              <a:rot lat="0" lon="0" rev="1200000"/>
-            </a:lightRig>
-          </a:scene3d>
-          <a:sp3d>
-            <a:bevelT w="63500" h="25400"/>
-          </a:sp3d>
-        </a:effectStyle>
-      </a:effectStyleLst>
-      <a:bgFillStyleLst>
-        <a:solidFill>
-          <a:schemeClr val="phClr"/>
-        </a:solidFill>
-        <a:gradFill rotWithShape="1">
-          <a:gsLst>
-            <a:gs pos="0">
-              <a:schemeClr val="phClr">
-                <a:tint val="40000"/>
-                <a:satMod val="350000"/>
-              </a:schemeClr>
-            </a:gs>
-            <a:gs pos="40000">
-              <a:schemeClr val="phClr">
-                <a:tint val="45000"/>
-                <a:shade val="99000"/>
-                <a:satMod val="350000"/>
-              </a:schemeClr>
-            </a:gs>
-            <a:gs pos="100000">
-              <a:schemeClr val="phClr">
-                <a:shade val="20000"/>
-                <a:satMod val="255000"/>
-              </a:schemeClr>
-            </a:gs>
-          </a:gsLst>
-          <a:path path="circle">
-            <a:fillToRect l="50000" t="-80000" r="50000" b="180000"/>
-          </a:path>
-        </a:gradFill>
-        <a:gradFill rotWithShape="1">
-          <a:gsLst>
-            <a:gs pos="0">
-              <a:schemeClr val="phClr">
-                <a:tint val="80000"/>
-                <a:satMod val="300000"/>
-              </a:schemeClr>
-            </a:gs>
-            <a:gs pos="100000">
-              <a:schemeClr val="phClr">
-                <a:shade val="30000"/>
-                <a:satMod val="200000"/>
-              </a:schemeClr>
-            </a:gs>
-          </a:gsLst>
-          <a:path path="circle">
-            <a:fillToRect l="50000" t="50000" r="50000" b="50000"/>
-          </a:path>
-        </a:gradFill>
-      </a:bgFillStyleLst>
-    </a:fmtScheme>
-  </a:themeElements>
-  <a:objectDefaults/>
-  <a:extraClrSchemeLst/>
-</a:theme>
 </file>
</xml_diff>